<commit_message>
UI Design Template_v0.6.pptx 수정
</commit_message>
<xml_diff>
--- a/doc/3_ 설계서/UI Design Template_v0.6.pptx
+++ b/doc/3_ 설계서/UI Design Template_v0.6.pptx
@@ -153,6 +153,41 @@
       </a:defRPr>
     </a:lvl9pPr>
   </p:defaultTextStyle>
+  <p:extLst>
+    <p:ext uri="{EFAFB233-063F-42B5-8137-9DF3F51BA10A}">
+      <p15:sldGuideLst xmlns:p15="http://schemas.microsoft.com/office/powerpoint/2012/main" xmlns="">
+        <p15:guide id="1" orient="horz">
+          <p15:clr>
+            <a:srgbClr val="A4A3A4"/>
+          </p15:clr>
+        </p15:guide>
+        <p15:guide id="2" pos="2880">
+          <p15:clr>
+            <a:srgbClr val="A4A3A4"/>
+          </p15:clr>
+        </p15:guide>
+        <p15:guide id="3" pos="6">
+          <p15:clr>
+            <a:srgbClr val="A4A3A4"/>
+          </p15:clr>
+        </p15:guide>
+      </p15:sldGuideLst>
+    </p:ext>
+    <p:ext uri="{2D200454-40CA-4A62-9FC3-DE9A4176ACB9}">
+      <p15:notesGuideLst xmlns:p15="http://schemas.microsoft.com/office/powerpoint/2012/main" xmlns="">
+        <p15:guide id="1" orient="horz" pos="3126">
+          <p15:clr>
+            <a:srgbClr val="A4A3A4"/>
+          </p15:clr>
+        </p15:guide>
+        <p15:guide id="2" pos="2140">
+          <p15:clr>
+            <a:srgbClr val="A4A3A4"/>
+          </p15:clr>
+        </p15:guide>
+      </p15:notesGuideLst>
+    </p:ext>
+  </p:extLst>
 </p:presentation>
 </file>
 
@@ -2239,8 +2274,8 @@
         </p:nvSpPr>
         <p:spPr>
           <a:xfrm>
-            <a:off x="6847128" y="4399599"/>
-            <a:ext cx="1653017" cy="400110"/>
+            <a:off x="6216672" y="4399726"/>
+            <a:ext cx="2420856" cy="400110"/>
           </a:xfrm>
           <a:prstGeom prst="rect">
             <a:avLst/>
@@ -2254,8 +2289,16 @@
           <a:lstStyle/>
           <a:p>
             <a:r>
+              <a:rPr lang="en-US" altLang="ko-KR" sz="2000" dirty="0" smtClean="0"/>
+              <a:t>&lt;Eight Eureka 8</a:t>
+            </a:r>
+            <a:r>
+              <a:rPr lang="ko-KR" altLang="en-US" sz="2000" dirty="0" smtClean="0"/>
+              <a:t>조</a:t>
+            </a:r>
+            <a:r>
               <a:rPr lang="en-US" altLang="ko-KR" sz="2000" dirty="0"/>
-              <a:t>Eight Eureka</a:t>
+              <a:t>&gt;</a:t>
             </a:r>
             <a:endParaRPr lang="ko-KR" altLang="en-US" sz="2000" dirty="0"/>
           </a:p>
@@ -2304,8 +2347,13 @@
             <a:pPr algn="r"/>
             <a:r>
               <a:rPr lang="en-US" altLang="ko-KR" dirty="0"/>
-              <a:t>Eight Eureka</a:t>
+              <a:t>Eight Eureka 8</a:t>
             </a:r>
+            <a:r>
+              <a:rPr lang="ko-KR" altLang="en-US" dirty="0"/>
+              <a:t>조</a:t>
+            </a:r>
+            <a:endParaRPr lang="en-US" altLang="ko-KR" dirty="0"/>
           </a:p>
         </p:txBody>
       </p:sp>
@@ -3674,7 +3722,7 @@
           <p:nvPr>
             <p:extLst>
               <p:ext uri="{D42A27DB-BD31-4B8C-83A1-F6EECF244321}">
-                <p14:modId xmlns:p14="http://schemas.microsoft.com/office/powerpoint/2010/main" val="2342063105"/>
+                <p14:modId xmlns:p14="http://schemas.microsoft.com/office/powerpoint/2010/main" val="813875059"/>
               </p:ext>
             </p:extLst>
           </p:nvPr>
@@ -3688,12 +3736,48 @@
             <a:tbl>
               <a:tblPr/>
               <a:tblGrid>
-                <a:gridCol w="1024554"/>
-                <a:gridCol w="2983884"/>
-                <a:gridCol w="1196090"/>
-                <a:gridCol w="1859283"/>
-                <a:gridCol w="597313"/>
-                <a:gridCol w="1272218"/>
+                <a:gridCol w="1024554">
+                  <a:extLst>
+                    <a:ext uri="{9D8B030D-6E8A-4147-A177-3AD203B41FA5}">
+                      <a16:colId xmlns:a16="http://schemas.microsoft.com/office/drawing/2014/main" xmlns="" val="20000"/>
+                    </a:ext>
+                  </a:extLst>
+                </a:gridCol>
+                <a:gridCol w="2983884">
+                  <a:extLst>
+                    <a:ext uri="{9D8B030D-6E8A-4147-A177-3AD203B41FA5}">
+                      <a16:colId xmlns:a16="http://schemas.microsoft.com/office/drawing/2014/main" xmlns="" val="20001"/>
+                    </a:ext>
+                  </a:extLst>
+                </a:gridCol>
+                <a:gridCol w="1196090">
+                  <a:extLst>
+                    <a:ext uri="{9D8B030D-6E8A-4147-A177-3AD203B41FA5}">
+                      <a16:colId xmlns:a16="http://schemas.microsoft.com/office/drawing/2014/main" xmlns="" val="20002"/>
+                    </a:ext>
+                  </a:extLst>
+                </a:gridCol>
+                <a:gridCol w="1859283">
+                  <a:extLst>
+                    <a:ext uri="{9D8B030D-6E8A-4147-A177-3AD203B41FA5}">
+                      <a16:colId xmlns:a16="http://schemas.microsoft.com/office/drawing/2014/main" xmlns="" val="20003"/>
+                    </a:ext>
+                  </a:extLst>
+                </a:gridCol>
+                <a:gridCol w="597313">
+                  <a:extLst>
+                    <a:ext uri="{9D8B030D-6E8A-4147-A177-3AD203B41FA5}">
+                      <a16:colId xmlns:a16="http://schemas.microsoft.com/office/drawing/2014/main" xmlns="" val="20004"/>
+                    </a:ext>
+                  </a:extLst>
+                </a:gridCol>
+                <a:gridCol w="1272218">
+                  <a:extLst>
+                    <a:ext uri="{9D8B030D-6E8A-4147-A177-3AD203B41FA5}">
+                      <a16:colId xmlns:a16="http://schemas.microsoft.com/office/drawing/2014/main" xmlns="" val="20005"/>
+                    </a:ext>
+                  </a:extLst>
+                </a:gridCol>
               </a:tblGrid>
               <a:tr h="299619">
                 <a:tc>
@@ -4281,6 +4365,11 @@
                     <a:noFill/>
                   </a:tcPr>
                 </a:tc>
+                <a:extLst>
+                  <a:ext uri="{0D108BD9-81ED-4DB2-BD59-A6C34878D82A}">
+                    <a16:rowId xmlns:a16="http://schemas.microsoft.com/office/drawing/2014/main" xmlns="" val="10000"/>
+                  </a:ext>
+                </a:extLst>
               </a:tr>
               <a:tr h="297106">
                 <a:tc>
@@ -4777,7 +4866,7 @@
                           <a:latin typeface="맑은 고딕" pitchFamily="50" charset="-127"/>
                           <a:ea typeface="맑은 고딕" pitchFamily="50" charset="-127"/>
                         </a:rPr>
-                        <a:t>2017.05.26 (V1.0)</a:t>
+                        <a:t>2017.05.26 (V0.6)</a:t>
                       </a:r>
                       <a:endParaRPr lang="ko-KR" altLang="en-US" sz="900" b="0" dirty="0">
                         <a:solidFill>
@@ -4834,6 +4923,11 @@
                     <a:noFill/>
                   </a:tcPr>
                 </a:tc>
+                <a:extLst>
+                  <a:ext uri="{0D108BD9-81ED-4DB2-BD59-A6C34878D82A}">
+                    <a16:rowId xmlns:a16="http://schemas.microsoft.com/office/drawing/2014/main" xmlns="" val="10001"/>
+                  </a:ext>
+                </a:extLst>
               </a:tr>
               <a:tr h="297106">
                 <a:tc>
@@ -5354,6 +5448,11 @@
                     <a:noFill/>
                   </a:tcPr>
                 </a:tc>
+                <a:extLst>
+                  <a:ext uri="{0D108BD9-81ED-4DB2-BD59-A6C34878D82A}">
+                    <a16:rowId xmlns:a16="http://schemas.microsoft.com/office/drawing/2014/main" xmlns="" val="10002"/>
+                  </a:ext>
+                </a:extLst>
               </a:tr>
             </a:tbl>
           </a:graphicData>
@@ -5471,8 +5570,13 @@
             <a:pPr algn="r"/>
             <a:r>
               <a:rPr lang="en-US" altLang="ko-KR" dirty="0"/>
-              <a:t>Eight Eureka</a:t>
+              <a:t>Eight Eureka 8</a:t>
             </a:r>
+            <a:r>
+              <a:rPr lang="ko-KR" altLang="en-US" dirty="0"/>
+              <a:t>조</a:t>
+            </a:r>
+            <a:endParaRPr lang="en-US" altLang="ko-KR" dirty="0"/>
           </a:p>
         </p:txBody>
       </p:sp>
@@ -6390,7 +6494,7 @@
           <p:nvPr>
             <p:extLst>
               <p:ext uri="{D42A27DB-BD31-4B8C-83A1-F6EECF244321}">
-                <p14:modId xmlns:p14="http://schemas.microsoft.com/office/powerpoint/2010/main" val="3616528334"/>
+                <p14:modId xmlns:p14="http://schemas.microsoft.com/office/powerpoint/2010/main" val="3154342734"/>
               </p:ext>
             </p:extLst>
           </p:nvPr>
@@ -6407,42 +6511,42 @@
                 <a:gridCol w="1024554">
                   <a:extLst>
                     <a:ext uri="{9D8B030D-6E8A-4147-A177-3AD203B41FA5}">
-                      <a16:colId xmlns="" xmlns:a16="http://schemas.microsoft.com/office/drawing/2014/main" val="20000"/>
+                      <a16:colId xmlns:a16="http://schemas.microsoft.com/office/drawing/2014/main" xmlns="" val="20000"/>
                     </a:ext>
                   </a:extLst>
                 </a:gridCol>
                 <a:gridCol w="2983884">
                   <a:extLst>
                     <a:ext uri="{9D8B030D-6E8A-4147-A177-3AD203B41FA5}">
-                      <a16:colId xmlns="" xmlns:a16="http://schemas.microsoft.com/office/drawing/2014/main" val="20001"/>
+                      <a16:colId xmlns:a16="http://schemas.microsoft.com/office/drawing/2014/main" xmlns="" val="20001"/>
                     </a:ext>
                   </a:extLst>
                 </a:gridCol>
                 <a:gridCol w="1196090">
                   <a:extLst>
                     <a:ext uri="{9D8B030D-6E8A-4147-A177-3AD203B41FA5}">
-                      <a16:colId xmlns="" xmlns:a16="http://schemas.microsoft.com/office/drawing/2014/main" val="20002"/>
+                      <a16:colId xmlns:a16="http://schemas.microsoft.com/office/drawing/2014/main" xmlns="" val="20002"/>
                     </a:ext>
                   </a:extLst>
                 </a:gridCol>
                 <a:gridCol w="1859283">
                   <a:extLst>
                     <a:ext uri="{9D8B030D-6E8A-4147-A177-3AD203B41FA5}">
-                      <a16:colId xmlns="" xmlns:a16="http://schemas.microsoft.com/office/drawing/2014/main" val="20003"/>
+                      <a16:colId xmlns:a16="http://schemas.microsoft.com/office/drawing/2014/main" xmlns="" val="20003"/>
                     </a:ext>
                   </a:extLst>
                 </a:gridCol>
                 <a:gridCol w="597313">
                   <a:extLst>
                     <a:ext uri="{9D8B030D-6E8A-4147-A177-3AD203B41FA5}">
-                      <a16:colId xmlns="" xmlns:a16="http://schemas.microsoft.com/office/drawing/2014/main" val="20004"/>
+                      <a16:colId xmlns:a16="http://schemas.microsoft.com/office/drawing/2014/main" xmlns="" val="20004"/>
                     </a:ext>
                   </a:extLst>
                 </a:gridCol>
                 <a:gridCol w="1272218">
                   <a:extLst>
                     <a:ext uri="{9D8B030D-6E8A-4147-A177-3AD203B41FA5}">
-                      <a16:colId xmlns="" xmlns:a16="http://schemas.microsoft.com/office/drawing/2014/main" val="20005"/>
+                      <a16:colId xmlns:a16="http://schemas.microsoft.com/office/drawing/2014/main" xmlns="" val="20005"/>
                     </a:ext>
                   </a:extLst>
                 </a:gridCol>
@@ -7035,7 +7139,7 @@
                 </a:tc>
                 <a:extLst>
                   <a:ext uri="{0D108BD9-81ED-4DB2-BD59-A6C34878D82A}">
-                    <a16:rowId xmlns="" xmlns:a16="http://schemas.microsoft.com/office/drawing/2014/main" val="10000"/>
+                    <a16:rowId xmlns:a16="http://schemas.microsoft.com/office/drawing/2014/main" xmlns="" val="10000"/>
                   </a:ext>
                 </a:extLst>
               </a:tr>
@@ -7534,7 +7638,7 @@
                           <a:latin typeface="맑은 고딕" pitchFamily="50" charset="-127"/>
                           <a:ea typeface="맑은 고딕" pitchFamily="50" charset="-127"/>
                         </a:rPr>
-                        <a:t>2017.05.26 (V1.0)</a:t>
+                        <a:t>2017.05.26 (V0.6)</a:t>
                       </a:r>
                       <a:endParaRPr lang="ko-KR" altLang="en-US" sz="900" b="0" dirty="0">
                         <a:solidFill>
@@ -7593,7 +7697,7 @@
                 </a:tc>
                 <a:extLst>
                   <a:ext uri="{0D108BD9-81ED-4DB2-BD59-A6C34878D82A}">
-                    <a16:rowId xmlns="" xmlns:a16="http://schemas.microsoft.com/office/drawing/2014/main" val="10001"/>
+                    <a16:rowId xmlns:a16="http://schemas.microsoft.com/office/drawing/2014/main" xmlns="" val="10001"/>
                   </a:ext>
                 </a:extLst>
               </a:tr>
@@ -7719,7 +7823,7 @@
                         <a:tabLst/>
                       </a:pPr>
                       <a:r>
-                        <a:rPr kumimoji="1" lang="en-US" altLang="ko-KR" sz="900" b="0" i="0" u="none" strike="noStrike" cap="none" normalizeH="0" baseline="0" dirty="0" smtClean="0">
+                        <a:rPr kumimoji="1" lang="en-US" altLang="ko-KR" sz="900" b="0" i="0" u="none" strike="noStrike" cap="none" normalizeH="0" baseline="0" smtClean="0">
                           <a:ln>
                             <a:noFill/>
                           </a:ln>
@@ -7730,7 +7834,7 @@
                           <a:latin typeface="맑은 고딕" pitchFamily="50" charset="-127"/>
                           <a:ea typeface="맑은 고딕" pitchFamily="50" charset="-127"/>
                         </a:rPr>
-                        <a:t>UC002, UC003</a:t>
+                        <a:t>UC003, UC004, UC006, UC007, UC008, UC009, UC010, UC011, UC012, UC013, UC018</a:t>
                       </a:r>
                       <a:endParaRPr kumimoji="1" lang="ko-KR" altLang="ko-KR" sz="900" b="0" i="0" u="none" strike="noStrike" cap="none" normalizeH="0" baseline="0" dirty="0" smtClean="0">
                         <a:ln>
@@ -8117,7 +8221,7 @@
                 </a:tc>
                 <a:extLst>
                   <a:ext uri="{0D108BD9-81ED-4DB2-BD59-A6C34878D82A}">
-                    <a16:rowId xmlns="" xmlns:a16="http://schemas.microsoft.com/office/drawing/2014/main" val="10002"/>
+                    <a16:rowId xmlns:a16="http://schemas.microsoft.com/office/drawing/2014/main" xmlns="" val="10002"/>
                   </a:ext>
                 </a:extLst>
               </a:tr>
@@ -8204,8 +8308,13 @@
             <a:pPr algn="r"/>
             <a:r>
               <a:rPr lang="en-US" altLang="ko-KR" dirty="0"/>
-              <a:t>Eight Eureka</a:t>
+              <a:t>Eight Eureka 8</a:t>
             </a:r>
+            <a:r>
+              <a:rPr lang="ko-KR" altLang="en-US" dirty="0"/>
+              <a:t>조</a:t>
+            </a:r>
+            <a:endParaRPr lang="en-US" altLang="ko-KR" dirty="0"/>
           </a:p>
         </p:txBody>
       </p:sp>
@@ -9087,7 +9196,7 @@
           <p:nvPr>
             <p:extLst>
               <p:ext uri="{D42A27DB-BD31-4B8C-83A1-F6EECF244321}">
-                <p14:modId xmlns:p14="http://schemas.microsoft.com/office/powerpoint/2010/main" val="3931210000"/>
+                <p14:modId xmlns:p14="http://schemas.microsoft.com/office/powerpoint/2010/main" val="461780513"/>
               </p:ext>
             </p:extLst>
           </p:nvPr>
@@ -9104,42 +9213,42 @@
                 <a:gridCol w="1024554">
                   <a:extLst>
                     <a:ext uri="{9D8B030D-6E8A-4147-A177-3AD203B41FA5}">
-                      <a16:colId xmlns="" xmlns:a16="http://schemas.microsoft.com/office/drawing/2014/main" val="20000"/>
+                      <a16:colId xmlns:a16="http://schemas.microsoft.com/office/drawing/2014/main" xmlns="" val="20000"/>
                     </a:ext>
                   </a:extLst>
                 </a:gridCol>
                 <a:gridCol w="2983884">
                   <a:extLst>
                     <a:ext uri="{9D8B030D-6E8A-4147-A177-3AD203B41FA5}">
-                      <a16:colId xmlns="" xmlns:a16="http://schemas.microsoft.com/office/drawing/2014/main" val="20001"/>
+                      <a16:colId xmlns:a16="http://schemas.microsoft.com/office/drawing/2014/main" xmlns="" val="20001"/>
                     </a:ext>
                   </a:extLst>
                 </a:gridCol>
                 <a:gridCol w="1196090">
                   <a:extLst>
                     <a:ext uri="{9D8B030D-6E8A-4147-A177-3AD203B41FA5}">
-                      <a16:colId xmlns="" xmlns:a16="http://schemas.microsoft.com/office/drawing/2014/main" val="20002"/>
+                      <a16:colId xmlns:a16="http://schemas.microsoft.com/office/drawing/2014/main" xmlns="" val="20002"/>
                     </a:ext>
                   </a:extLst>
                 </a:gridCol>
                 <a:gridCol w="1859283">
                   <a:extLst>
                     <a:ext uri="{9D8B030D-6E8A-4147-A177-3AD203B41FA5}">
-                      <a16:colId xmlns="" xmlns:a16="http://schemas.microsoft.com/office/drawing/2014/main" val="20003"/>
+                      <a16:colId xmlns:a16="http://schemas.microsoft.com/office/drawing/2014/main" xmlns="" val="20003"/>
                     </a:ext>
                   </a:extLst>
                 </a:gridCol>
                 <a:gridCol w="597313">
                   <a:extLst>
                     <a:ext uri="{9D8B030D-6E8A-4147-A177-3AD203B41FA5}">
-                      <a16:colId xmlns="" xmlns:a16="http://schemas.microsoft.com/office/drawing/2014/main" val="20004"/>
+                      <a16:colId xmlns:a16="http://schemas.microsoft.com/office/drawing/2014/main" xmlns="" val="20004"/>
                     </a:ext>
                   </a:extLst>
                 </a:gridCol>
                 <a:gridCol w="1272218">
                   <a:extLst>
                     <a:ext uri="{9D8B030D-6E8A-4147-A177-3AD203B41FA5}">
-                      <a16:colId xmlns="" xmlns:a16="http://schemas.microsoft.com/office/drawing/2014/main" val="20005"/>
+                      <a16:colId xmlns:a16="http://schemas.microsoft.com/office/drawing/2014/main" xmlns="" val="20005"/>
                     </a:ext>
                   </a:extLst>
                 </a:gridCol>
@@ -9732,7 +9841,7 @@
                 </a:tc>
                 <a:extLst>
                   <a:ext uri="{0D108BD9-81ED-4DB2-BD59-A6C34878D82A}">
-                    <a16:rowId xmlns="" xmlns:a16="http://schemas.microsoft.com/office/drawing/2014/main" val="10000"/>
+                    <a16:rowId xmlns:a16="http://schemas.microsoft.com/office/drawing/2014/main" xmlns="" val="10000"/>
                   </a:ext>
                 </a:extLst>
               </a:tr>
@@ -10231,7 +10340,7 @@
                           <a:latin typeface="맑은 고딕" pitchFamily="50" charset="-127"/>
                           <a:ea typeface="맑은 고딕" pitchFamily="50" charset="-127"/>
                         </a:rPr>
-                        <a:t>2017.05.26 (V1.0)</a:t>
+                        <a:t>2017.05.26 (V10.6)</a:t>
                       </a:r>
                       <a:endParaRPr lang="ko-KR" altLang="en-US" sz="900" b="0" dirty="0">
                         <a:solidFill>
@@ -10290,7 +10399,7 @@
                 </a:tc>
                 <a:extLst>
                   <a:ext uri="{0D108BD9-81ED-4DB2-BD59-A6C34878D82A}">
-                    <a16:rowId xmlns="" xmlns:a16="http://schemas.microsoft.com/office/drawing/2014/main" val="10001"/>
+                    <a16:rowId xmlns:a16="http://schemas.microsoft.com/office/drawing/2014/main" xmlns="" val="10001"/>
                   </a:ext>
                 </a:extLst>
               </a:tr>
@@ -10427,7 +10536,7 @@
                           <a:latin typeface="맑은 고딕" pitchFamily="50" charset="-127"/>
                           <a:ea typeface="맑은 고딕" pitchFamily="50" charset="-127"/>
                         </a:rPr>
-                        <a:t>UC003, UC004, UC006, UC007, UC008, UC009, UC010, UC011, UC012, UC013, UC018</a:t>
+                        <a:t>UC001, UC002, UC003</a:t>
                       </a:r>
                       <a:endParaRPr kumimoji="1" lang="ko-KR" altLang="ko-KR" sz="900" b="0" i="0" u="none" strike="noStrike" cap="none" normalizeH="0" baseline="0" dirty="0" smtClean="0">
                         <a:ln>
@@ -10814,7 +10923,7 @@
                 </a:tc>
                 <a:extLst>
                   <a:ext uri="{0D108BD9-81ED-4DB2-BD59-A6C34878D82A}">
-                    <a16:rowId xmlns="" xmlns:a16="http://schemas.microsoft.com/office/drawing/2014/main" val="10002"/>
+                    <a16:rowId xmlns:a16="http://schemas.microsoft.com/office/drawing/2014/main" xmlns="" val="10002"/>
                   </a:ext>
                 </a:extLst>
               </a:tr>
@@ -10901,8 +11010,13 @@
             <a:pPr algn="r"/>
             <a:r>
               <a:rPr lang="en-US" altLang="ko-KR" dirty="0"/>
-              <a:t>Eight Eureka</a:t>
+              <a:t>Eight Eureka 8</a:t>
             </a:r>
+            <a:r>
+              <a:rPr lang="ko-KR" altLang="en-US" dirty="0"/>
+              <a:t>조</a:t>
+            </a:r>
+            <a:endParaRPr lang="en-US" altLang="ko-KR" dirty="0"/>
           </a:p>
         </p:txBody>
       </p:sp>
@@ -10915,7 +11029,7 @@
           <p:nvPr>
             <p:extLst>
               <p:ext uri="{D42A27DB-BD31-4B8C-83A1-F6EECF244321}">
-                <p14:modId xmlns:p14="http://schemas.microsoft.com/office/powerpoint/2010/main" val="2181546906"/>
+                <p14:modId xmlns:p14="http://schemas.microsoft.com/office/powerpoint/2010/main" val="4201955483"/>
               </p:ext>
             </p:extLst>
           </p:nvPr>
@@ -10929,12 +11043,48 @@
             <a:tbl>
               <a:tblPr/>
               <a:tblGrid>
-                <a:gridCol w="1024554"/>
-                <a:gridCol w="2983884"/>
-                <a:gridCol w="1196090"/>
-                <a:gridCol w="1859283"/>
-                <a:gridCol w="597313"/>
-                <a:gridCol w="1272218"/>
+                <a:gridCol w="1024554">
+                  <a:extLst>
+                    <a:ext uri="{9D8B030D-6E8A-4147-A177-3AD203B41FA5}">
+                      <a16:colId xmlns:a16="http://schemas.microsoft.com/office/drawing/2014/main" xmlns="" val="20000"/>
+                    </a:ext>
+                  </a:extLst>
+                </a:gridCol>
+                <a:gridCol w="2983884">
+                  <a:extLst>
+                    <a:ext uri="{9D8B030D-6E8A-4147-A177-3AD203B41FA5}">
+                      <a16:colId xmlns:a16="http://schemas.microsoft.com/office/drawing/2014/main" xmlns="" val="20001"/>
+                    </a:ext>
+                  </a:extLst>
+                </a:gridCol>
+                <a:gridCol w="1196090">
+                  <a:extLst>
+                    <a:ext uri="{9D8B030D-6E8A-4147-A177-3AD203B41FA5}">
+                      <a16:colId xmlns:a16="http://schemas.microsoft.com/office/drawing/2014/main" xmlns="" val="20002"/>
+                    </a:ext>
+                  </a:extLst>
+                </a:gridCol>
+                <a:gridCol w="1859283">
+                  <a:extLst>
+                    <a:ext uri="{9D8B030D-6E8A-4147-A177-3AD203B41FA5}">
+                      <a16:colId xmlns:a16="http://schemas.microsoft.com/office/drawing/2014/main" xmlns="" val="20003"/>
+                    </a:ext>
+                  </a:extLst>
+                </a:gridCol>
+                <a:gridCol w="597313">
+                  <a:extLst>
+                    <a:ext uri="{9D8B030D-6E8A-4147-A177-3AD203B41FA5}">
+                      <a16:colId xmlns:a16="http://schemas.microsoft.com/office/drawing/2014/main" xmlns="" val="20004"/>
+                    </a:ext>
+                  </a:extLst>
+                </a:gridCol>
+                <a:gridCol w="1272218">
+                  <a:extLst>
+                    <a:ext uri="{9D8B030D-6E8A-4147-A177-3AD203B41FA5}">
+                      <a16:colId xmlns:a16="http://schemas.microsoft.com/office/drawing/2014/main" xmlns="" val="20005"/>
+                    </a:ext>
+                  </a:extLst>
+                </a:gridCol>
               </a:tblGrid>
               <a:tr h="299619">
                 <a:tc>
@@ -11523,6 +11673,11 @@
                     <a:noFill/>
                   </a:tcPr>
                 </a:tc>
+                <a:extLst>
+                  <a:ext uri="{0D108BD9-81ED-4DB2-BD59-A6C34878D82A}">
+                    <a16:rowId xmlns:a16="http://schemas.microsoft.com/office/drawing/2014/main" xmlns="" val="10000"/>
+                  </a:ext>
+                </a:extLst>
               </a:tr>
               <a:tr h="297106">
                 <a:tc>
@@ -12019,7 +12174,7 @@
                           <a:latin typeface="맑은 고딕" pitchFamily="50" charset="-127"/>
                           <a:ea typeface="맑은 고딕" pitchFamily="50" charset="-127"/>
                         </a:rPr>
-                        <a:t>2017.05.26 (V1.0)</a:t>
+                        <a:t>2017.05.26 (V0.6)</a:t>
                       </a:r>
                       <a:endParaRPr lang="ko-KR" altLang="en-US" sz="900" b="0" dirty="0">
                         <a:solidFill>
@@ -12076,6 +12231,11 @@
                     <a:noFill/>
                   </a:tcPr>
                 </a:tc>
+                <a:extLst>
+                  <a:ext uri="{0D108BD9-81ED-4DB2-BD59-A6C34878D82A}">
+                    <a16:rowId xmlns:a16="http://schemas.microsoft.com/office/drawing/2014/main" xmlns="" val="10001"/>
+                  </a:ext>
+                </a:extLst>
               </a:tr>
               <a:tr h="297106">
                 <a:tc>
@@ -12596,6 +12756,11 @@
                     <a:noFill/>
                   </a:tcPr>
                 </a:tc>
+                <a:extLst>
+                  <a:ext uri="{0D108BD9-81ED-4DB2-BD59-A6C34878D82A}">
+                    <a16:rowId xmlns:a16="http://schemas.microsoft.com/office/drawing/2014/main" xmlns="" val="10002"/>
+                  </a:ext>
+                </a:extLst>
               </a:tr>
             </a:tbl>
           </a:graphicData>
@@ -12713,8 +12878,13 @@
             <a:pPr algn="r"/>
             <a:r>
               <a:rPr lang="en-US" altLang="ko-KR" dirty="0"/>
-              <a:t>Eight Eureka</a:t>
+              <a:t>Eight Eureka 8</a:t>
             </a:r>
+            <a:r>
+              <a:rPr lang="ko-KR" altLang="en-US" dirty="0"/>
+              <a:t>조</a:t>
+            </a:r>
+            <a:endParaRPr lang="en-US" altLang="ko-KR" dirty="0"/>
           </a:p>
         </p:txBody>
       </p:sp>
@@ -12727,7 +12897,7 @@
           <p:nvPr>
             <p:extLst>
               <p:ext uri="{D42A27DB-BD31-4B8C-83A1-F6EECF244321}">
-                <p14:modId xmlns:p14="http://schemas.microsoft.com/office/powerpoint/2010/main" val="315129339"/>
+                <p14:modId xmlns:p14="http://schemas.microsoft.com/office/powerpoint/2010/main" val="1804778067"/>
               </p:ext>
             </p:extLst>
           </p:nvPr>
@@ -12741,12 +12911,48 @@
             <a:tbl>
               <a:tblPr/>
               <a:tblGrid>
-                <a:gridCol w="1024554"/>
-                <a:gridCol w="2983884"/>
-                <a:gridCol w="1196090"/>
-                <a:gridCol w="1859283"/>
-                <a:gridCol w="597313"/>
-                <a:gridCol w="1272218"/>
+                <a:gridCol w="1024554">
+                  <a:extLst>
+                    <a:ext uri="{9D8B030D-6E8A-4147-A177-3AD203B41FA5}">
+                      <a16:colId xmlns:a16="http://schemas.microsoft.com/office/drawing/2014/main" xmlns="" val="20000"/>
+                    </a:ext>
+                  </a:extLst>
+                </a:gridCol>
+                <a:gridCol w="2983884">
+                  <a:extLst>
+                    <a:ext uri="{9D8B030D-6E8A-4147-A177-3AD203B41FA5}">
+                      <a16:colId xmlns:a16="http://schemas.microsoft.com/office/drawing/2014/main" xmlns="" val="20001"/>
+                    </a:ext>
+                  </a:extLst>
+                </a:gridCol>
+                <a:gridCol w="1196090">
+                  <a:extLst>
+                    <a:ext uri="{9D8B030D-6E8A-4147-A177-3AD203B41FA5}">
+                      <a16:colId xmlns:a16="http://schemas.microsoft.com/office/drawing/2014/main" xmlns="" val="20002"/>
+                    </a:ext>
+                  </a:extLst>
+                </a:gridCol>
+                <a:gridCol w="1859283">
+                  <a:extLst>
+                    <a:ext uri="{9D8B030D-6E8A-4147-A177-3AD203B41FA5}">
+                      <a16:colId xmlns:a16="http://schemas.microsoft.com/office/drawing/2014/main" xmlns="" val="20003"/>
+                    </a:ext>
+                  </a:extLst>
+                </a:gridCol>
+                <a:gridCol w="597313">
+                  <a:extLst>
+                    <a:ext uri="{9D8B030D-6E8A-4147-A177-3AD203B41FA5}">
+                      <a16:colId xmlns:a16="http://schemas.microsoft.com/office/drawing/2014/main" xmlns="" val="20004"/>
+                    </a:ext>
+                  </a:extLst>
+                </a:gridCol>
+                <a:gridCol w="1272218">
+                  <a:extLst>
+                    <a:ext uri="{9D8B030D-6E8A-4147-A177-3AD203B41FA5}">
+                      <a16:colId xmlns:a16="http://schemas.microsoft.com/office/drawing/2014/main" xmlns="" val="20005"/>
+                    </a:ext>
+                  </a:extLst>
+                </a:gridCol>
               </a:tblGrid>
               <a:tr h="299619">
                 <a:tc>
@@ -13335,6 +13541,11 @@
                     <a:noFill/>
                   </a:tcPr>
                 </a:tc>
+                <a:extLst>
+                  <a:ext uri="{0D108BD9-81ED-4DB2-BD59-A6C34878D82A}">
+                    <a16:rowId xmlns:a16="http://schemas.microsoft.com/office/drawing/2014/main" xmlns="" val="10000"/>
+                  </a:ext>
+                </a:extLst>
               </a:tr>
               <a:tr h="297106">
                 <a:tc>
@@ -13832,7 +14043,7 @@
                           <a:latin typeface="맑은 고딕" pitchFamily="50" charset="-127"/>
                           <a:ea typeface="맑은 고딕" pitchFamily="50" charset="-127"/>
                         </a:rPr>
-                        <a:t>2017.05.26 (V1.0)</a:t>
+                        <a:t>2017.05.26 (V0.6)</a:t>
                       </a:r>
                       <a:endParaRPr lang="ko-KR" altLang="en-US" sz="900" b="0" dirty="0">
                         <a:solidFill>
@@ -13889,6 +14100,11 @@
                     <a:noFill/>
                   </a:tcPr>
                 </a:tc>
+                <a:extLst>
+                  <a:ext uri="{0D108BD9-81ED-4DB2-BD59-A6C34878D82A}">
+                    <a16:rowId xmlns:a16="http://schemas.microsoft.com/office/drawing/2014/main" xmlns="" val="10001"/>
+                  </a:ext>
+                </a:extLst>
               </a:tr>
               <a:tr h="297106">
                 <a:tc>
@@ -14409,6 +14625,11 @@
                     <a:noFill/>
                   </a:tcPr>
                 </a:tc>
+                <a:extLst>
+                  <a:ext uri="{0D108BD9-81ED-4DB2-BD59-A6C34878D82A}">
+                    <a16:rowId xmlns:a16="http://schemas.microsoft.com/office/drawing/2014/main" xmlns="" val="10002"/>
+                  </a:ext>
+                </a:extLst>
               </a:tr>
             </a:tbl>
           </a:graphicData>
@@ -14439,10 +14660,34 @@
                 <a:tableStyleId>{5940675A-B579-460E-94D1-54222C63F5DA}</a:tableStyleId>
               </a:tblPr>
               <a:tblGrid>
-                <a:gridCol w="504000"/>
-                <a:gridCol w="504000"/>
-                <a:gridCol w="1521016"/>
-                <a:gridCol w="1521016"/>
+                <a:gridCol w="504000">
+                  <a:extLst>
+                    <a:ext uri="{9D8B030D-6E8A-4147-A177-3AD203B41FA5}">
+                      <a16:colId xmlns:a16="http://schemas.microsoft.com/office/drawing/2014/main" xmlns="" val="20000"/>
+                    </a:ext>
+                  </a:extLst>
+                </a:gridCol>
+                <a:gridCol w="504000">
+                  <a:extLst>
+                    <a:ext uri="{9D8B030D-6E8A-4147-A177-3AD203B41FA5}">
+                      <a16:colId xmlns:a16="http://schemas.microsoft.com/office/drawing/2014/main" xmlns="" val="20001"/>
+                    </a:ext>
+                  </a:extLst>
+                </a:gridCol>
+                <a:gridCol w="1521016">
+                  <a:extLst>
+                    <a:ext uri="{9D8B030D-6E8A-4147-A177-3AD203B41FA5}">
+                      <a16:colId xmlns:a16="http://schemas.microsoft.com/office/drawing/2014/main" xmlns="" val="20002"/>
+                    </a:ext>
+                  </a:extLst>
+                </a:gridCol>
+                <a:gridCol w="1521016">
+                  <a:extLst>
+                    <a:ext uri="{9D8B030D-6E8A-4147-A177-3AD203B41FA5}">
+                      <a16:colId xmlns:a16="http://schemas.microsoft.com/office/drawing/2014/main" xmlns="" val="20003"/>
+                    </a:ext>
+                  </a:extLst>
+                </a:gridCol>
               </a:tblGrid>
               <a:tr h="289372">
                 <a:tc gridSpan="4">
@@ -14556,6 +14801,11 @@
                   </a:txBody>
                   <a:tcPr/>
                 </a:tc>
+                <a:extLst>
+                  <a:ext uri="{0D108BD9-81ED-4DB2-BD59-A6C34878D82A}">
+                    <a16:rowId xmlns:a16="http://schemas.microsoft.com/office/drawing/2014/main" xmlns="" val="10000"/>
+                  </a:ext>
+                </a:extLst>
               </a:tr>
               <a:tr h="289372">
                 <a:tc>
@@ -14714,6 +14964,11 @@
                     </a:solidFill>
                   </a:tcPr>
                 </a:tc>
+                <a:extLst>
+                  <a:ext uri="{0D108BD9-81ED-4DB2-BD59-A6C34878D82A}">
+                    <a16:rowId xmlns:a16="http://schemas.microsoft.com/office/drawing/2014/main" xmlns="" val="10001"/>
+                  </a:ext>
+                </a:extLst>
               </a:tr>
               <a:tr h="265258">
                 <a:tc>
@@ -14860,6 +15115,11 @@
                     </a:solidFill>
                   </a:tcPr>
                 </a:tc>
+                <a:extLst>
+                  <a:ext uri="{0D108BD9-81ED-4DB2-BD59-A6C34878D82A}">
+                    <a16:rowId xmlns:a16="http://schemas.microsoft.com/office/drawing/2014/main" xmlns="" val="10002"/>
+                  </a:ext>
+                </a:extLst>
               </a:tr>
               <a:tr h="265258">
                 <a:tc>
@@ -15022,6 +15282,11 @@
                     </a:solidFill>
                   </a:tcPr>
                 </a:tc>
+                <a:extLst>
+                  <a:ext uri="{0D108BD9-81ED-4DB2-BD59-A6C34878D82A}">
+                    <a16:rowId xmlns:a16="http://schemas.microsoft.com/office/drawing/2014/main" xmlns="" val="10003"/>
+                  </a:ext>
+                </a:extLst>
               </a:tr>
               <a:tr h="265258">
                 <a:tc>
@@ -15184,6 +15449,11 @@
                     </a:solidFill>
                   </a:tcPr>
                 </a:tc>
+                <a:extLst>
+                  <a:ext uri="{0D108BD9-81ED-4DB2-BD59-A6C34878D82A}">
+                    <a16:rowId xmlns:a16="http://schemas.microsoft.com/office/drawing/2014/main" xmlns="" val="10004"/>
+                  </a:ext>
+                </a:extLst>
               </a:tr>
               <a:tr h="265258">
                 <a:tc>
@@ -15352,6 +15622,11 @@
                     </a:solidFill>
                   </a:tcPr>
                 </a:tc>
+                <a:extLst>
+                  <a:ext uri="{0D108BD9-81ED-4DB2-BD59-A6C34878D82A}">
+                    <a16:rowId xmlns:a16="http://schemas.microsoft.com/office/drawing/2014/main" xmlns="" val="10005"/>
+                  </a:ext>
+                </a:extLst>
               </a:tr>
               <a:tr h="265258">
                 <a:tc>
@@ -15520,6 +15795,11 @@
                     </a:solidFill>
                   </a:tcPr>
                 </a:tc>
+                <a:extLst>
+                  <a:ext uri="{0D108BD9-81ED-4DB2-BD59-A6C34878D82A}">
+                    <a16:rowId xmlns:a16="http://schemas.microsoft.com/office/drawing/2014/main" xmlns="" val="10006"/>
+                  </a:ext>
+                </a:extLst>
               </a:tr>
               <a:tr h="434058">
                 <a:tc>
@@ -15688,6 +15968,11 @@
                     </a:solidFill>
                   </a:tcPr>
                 </a:tc>
+                <a:extLst>
+                  <a:ext uri="{0D108BD9-81ED-4DB2-BD59-A6C34878D82A}">
+                    <a16:rowId xmlns:a16="http://schemas.microsoft.com/office/drawing/2014/main" xmlns="" val="10007"/>
+                  </a:ext>
+                </a:extLst>
               </a:tr>
               <a:tr h="265258">
                 <a:tc>
@@ -15856,6 +16141,11 @@
                     </a:solidFill>
                   </a:tcPr>
                 </a:tc>
+                <a:extLst>
+                  <a:ext uri="{0D108BD9-81ED-4DB2-BD59-A6C34878D82A}">
+                    <a16:rowId xmlns:a16="http://schemas.microsoft.com/office/drawing/2014/main" xmlns="" val="10008"/>
+                  </a:ext>
+                </a:extLst>
               </a:tr>
               <a:tr h="265258">
                 <a:tc>
@@ -16024,6 +16314,11 @@
                     </a:solidFill>
                   </a:tcPr>
                 </a:tc>
+                <a:extLst>
+                  <a:ext uri="{0D108BD9-81ED-4DB2-BD59-A6C34878D82A}">
+                    <a16:rowId xmlns:a16="http://schemas.microsoft.com/office/drawing/2014/main" xmlns="" val="10009"/>
+                  </a:ext>
+                </a:extLst>
               </a:tr>
               <a:tr h="265258">
                 <a:tc>
@@ -16202,6 +16497,11 @@
                     </a:solidFill>
                   </a:tcPr>
                 </a:tc>
+                <a:extLst>
+                  <a:ext uri="{0D108BD9-81ED-4DB2-BD59-A6C34878D82A}">
+                    <a16:rowId xmlns:a16="http://schemas.microsoft.com/office/drawing/2014/main" xmlns="" val="10010"/>
+                  </a:ext>
+                </a:extLst>
               </a:tr>
               <a:tr h="265258">
                 <a:tc>
@@ -16364,6 +16664,11 @@
                     </a:solidFill>
                   </a:tcPr>
                 </a:tc>
+                <a:extLst>
+                  <a:ext uri="{0D108BD9-81ED-4DB2-BD59-A6C34878D82A}">
+                    <a16:rowId xmlns:a16="http://schemas.microsoft.com/office/drawing/2014/main" xmlns="" val="10011"/>
+                  </a:ext>
+                </a:extLst>
               </a:tr>
               <a:tr h="265258">
                 <a:tc>
@@ -16526,6 +16831,11 @@
                     </a:solidFill>
                   </a:tcPr>
                 </a:tc>
+                <a:extLst>
+                  <a:ext uri="{0D108BD9-81ED-4DB2-BD59-A6C34878D82A}">
+                    <a16:rowId xmlns:a16="http://schemas.microsoft.com/office/drawing/2014/main" xmlns="" val="10012"/>
+                  </a:ext>
+                </a:extLst>
               </a:tr>
               <a:tr h="265258">
                 <a:tc>
@@ -16694,6 +17004,11 @@
                     </a:solidFill>
                   </a:tcPr>
                 </a:tc>
+                <a:extLst>
+                  <a:ext uri="{0D108BD9-81ED-4DB2-BD59-A6C34878D82A}">
+                    <a16:rowId xmlns:a16="http://schemas.microsoft.com/office/drawing/2014/main" xmlns="" val="10013"/>
+                  </a:ext>
+                </a:extLst>
               </a:tr>
               <a:tr h="434058">
                 <a:tc>
@@ -16912,6 +17227,11 @@
                     </a:solidFill>
                   </a:tcPr>
                 </a:tc>
+                <a:extLst>
+                  <a:ext uri="{0D108BD9-81ED-4DB2-BD59-A6C34878D82A}">
+                    <a16:rowId xmlns:a16="http://schemas.microsoft.com/office/drawing/2014/main" xmlns="" val="10014"/>
+                  </a:ext>
+                </a:extLst>
               </a:tr>
               <a:tr h="294083">
                 <a:tc>
@@ -17080,6 +17400,11 @@
                     </a:solidFill>
                   </a:tcPr>
                 </a:tc>
+                <a:extLst>
+                  <a:ext uri="{0D108BD9-81ED-4DB2-BD59-A6C34878D82A}">
+                    <a16:rowId xmlns:a16="http://schemas.microsoft.com/office/drawing/2014/main" xmlns="" val="10015"/>
+                  </a:ext>
+                </a:extLst>
               </a:tr>
               <a:tr h="294083">
                 <a:tc>
@@ -17248,6 +17573,11 @@
                     </a:solidFill>
                   </a:tcPr>
                 </a:tc>
+                <a:extLst>
+                  <a:ext uri="{0D108BD9-81ED-4DB2-BD59-A6C34878D82A}">
+                    <a16:rowId xmlns:a16="http://schemas.microsoft.com/office/drawing/2014/main" xmlns="" val="10016"/>
+                  </a:ext>
+                </a:extLst>
               </a:tr>
             </a:tbl>
           </a:graphicData>
@@ -17278,10 +17608,34 @@
                 <a:tableStyleId>{5940675A-B579-460E-94D1-54222C63F5DA}</a:tableStyleId>
               </a:tblPr>
               <a:tblGrid>
-                <a:gridCol w="504000"/>
-                <a:gridCol w="504000"/>
-                <a:gridCol w="1521016"/>
-                <a:gridCol w="1521016"/>
+                <a:gridCol w="504000">
+                  <a:extLst>
+                    <a:ext uri="{9D8B030D-6E8A-4147-A177-3AD203B41FA5}">
+                      <a16:colId xmlns:a16="http://schemas.microsoft.com/office/drawing/2014/main" xmlns="" val="20000"/>
+                    </a:ext>
+                  </a:extLst>
+                </a:gridCol>
+                <a:gridCol w="504000">
+                  <a:extLst>
+                    <a:ext uri="{9D8B030D-6E8A-4147-A177-3AD203B41FA5}">
+                      <a16:colId xmlns:a16="http://schemas.microsoft.com/office/drawing/2014/main" xmlns="" val="20001"/>
+                    </a:ext>
+                  </a:extLst>
+                </a:gridCol>
+                <a:gridCol w="1521016">
+                  <a:extLst>
+                    <a:ext uri="{9D8B030D-6E8A-4147-A177-3AD203B41FA5}">
+                      <a16:colId xmlns:a16="http://schemas.microsoft.com/office/drawing/2014/main" xmlns="" val="20002"/>
+                    </a:ext>
+                  </a:extLst>
+                </a:gridCol>
+                <a:gridCol w="1521016">
+                  <a:extLst>
+                    <a:ext uri="{9D8B030D-6E8A-4147-A177-3AD203B41FA5}">
+                      <a16:colId xmlns:a16="http://schemas.microsoft.com/office/drawing/2014/main" xmlns="" val="20003"/>
+                    </a:ext>
+                  </a:extLst>
+                </a:gridCol>
               </a:tblGrid>
               <a:tr h="367903">
                 <a:tc gridSpan="4">
@@ -17395,6 +17749,11 @@
                   </a:txBody>
                   <a:tcPr/>
                 </a:tc>
+                <a:extLst>
+                  <a:ext uri="{0D108BD9-81ED-4DB2-BD59-A6C34878D82A}">
+                    <a16:rowId xmlns:a16="http://schemas.microsoft.com/office/drawing/2014/main" xmlns="" val="10000"/>
+                  </a:ext>
+                </a:extLst>
               </a:tr>
               <a:tr h="334555">
                 <a:tc>
@@ -17553,6 +17912,11 @@
                     </a:solidFill>
                   </a:tcPr>
                 </a:tc>
+                <a:extLst>
+                  <a:ext uri="{0D108BD9-81ED-4DB2-BD59-A6C34878D82A}">
+                    <a16:rowId xmlns:a16="http://schemas.microsoft.com/office/drawing/2014/main" xmlns="" val="10001"/>
+                  </a:ext>
+                </a:extLst>
               </a:tr>
               <a:tr h="306675">
                 <a:tc>
@@ -17721,6 +18085,11 @@
                     </a:solidFill>
                   </a:tcPr>
                 </a:tc>
+                <a:extLst>
+                  <a:ext uri="{0D108BD9-81ED-4DB2-BD59-A6C34878D82A}">
+                    <a16:rowId xmlns:a16="http://schemas.microsoft.com/office/drawing/2014/main" xmlns="" val="10002"/>
+                  </a:ext>
+                </a:extLst>
               </a:tr>
               <a:tr h="306675">
                 <a:tc>
@@ -17889,6 +18258,11 @@
                     </a:solidFill>
                   </a:tcPr>
                 </a:tc>
+                <a:extLst>
+                  <a:ext uri="{0D108BD9-81ED-4DB2-BD59-A6C34878D82A}">
+                    <a16:rowId xmlns:a16="http://schemas.microsoft.com/office/drawing/2014/main" xmlns="" val="10003"/>
+                  </a:ext>
+                </a:extLst>
               </a:tr>
               <a:tr h="306675">
                 <a:tc>
@@ -18061,6 +18435,11 @@
                     </a:solidFill>
                   </a:tcPr>
                 </a:tc>
+                <a:extLst>
+                  <a:ext uri="{0D108BD9-81ED-4DB2-BD59-A6C34878D82A}">
+                    <a16:rowId xmlns:a16="http://schemas.microsoft.com/office/drawing/2014/main" xmlns="" val="10004"/>
+                  </a:ext>
+                </a:extLst>
               </a:tr>
               <a:tr h="306675">
                 <a:tc>
@@ -18229,6 +18608,11 @@
                     </a:solidFill>
                   </a:tcPr>
                 </a:tc>
+                <a:extLst>
+                  <a:ext uri="{0D108BD9-81ED-4DB2-BD59-A6C34878D82A}">
+                    <a16:rowId xmlns:a16="http://schemas.microsoft.com/office/drawing/2014/main" xmlns="" val="10005"/>
+                  </a:ext>
+                </a:extLst>
               </a:tr>
               <a:tr h="263637">
                 <a:tc>
@@ -18397,6 +18781,11 @@
                     </a:solidFill>
                   </a:tcPr>
                 </a:tc>
+                <a:extLst>
+                  <a:ext uri="{0D108BD9-81ED-4DB2-BD59-A6C34878D82A}">
+                    <a16:rowId xmlns:a16="http://schemas.microsoft.com/office/drawing/2014/main" xmlns="" val="10006"/>
+                  </a:ext>
+                </a:extLst>
               </a:tr>
               <a:tr h="306675">
                 <a:tc>
@@ -18555,6 +18944,11 @@
                     </a:solidFill>
                   </a:tcPr>
                 </a:tc>
+                <a:extLst>
+                  <a:ext uri="{0D108BD9-81ED-4DB2-BD59-A6C34878D82A}">
+                    <a16:rowId xmlns:a16="http://schemas.microsoft.com/office/drawing/2014/main" xmlns="" val="10007"/>
+                  </a:ext>
+                </a:extLst>
               </a:tr>
               <a:tr h="306675">
                 <a:tc>
@@ -18723,6 +19117,11 @@
                     </a:solidFill>
                   </a:tcPr>
                 </a:tc>
+                <a:extLst>
+                  <a:ext uri="{0D108BD9-81ED-4DB2-BD59-A6C34878D82A}">
+                    <a16:rowId xmlns:a16="http://schemas.microsoft.com/office/drawing/2014/main" xmlns="" val="10008"/>
+                  </a:ext>
+                </a:extLst>
               </a:tr>
               <a:tr h="306675">
                 <a:tc>
@@ -18865,6 +19264,11 @@
                     </a:solidFill>
                   </a:tcPr>
                 </a:tc>
+                <a:extLst>
+                  <a:ext uri="{0D108BD9-81ED-4DB2-BD59-A6C34878D82A}">
+                    <a16:rowId xmlns:a16="http://schemas.microsoft.com/office/drawing/2014/main" xmlns="" val="10009"/>
+                  </a:ext>
+                </a:extLst>
               </a:tr>
               <a:tr h="306675">
                 <a:tc>
@@ -19023,6 +19427,11 @@
                     </a:solidFill>
                   </a:tcPr>
                 </a:tc>
+                <a:extLst>
+                  <a:ext uri="{0D108BD9-81ED-4DB2-BD59-A6C34878D82A}">
+                    <a16:rowId xmlns:a16="http://schemas.microsoft.com/office/drawing/2014/main" xmlns="" val="10010"/>
+                  </a:ext>
+                </a:extLst>
               </a:tr>
               <a:tr h="306675">
                 <a:tc>
@@ -19181,6 +19590,11 @@
                     </a:solidFill>
                   </a:tcPr>
                 </a:tc>
+                <a:extLst>
+                  <a:ext uri="{0D108BD9-81ED-4DB2-BD59-A6C34878D82A}">
+                    <a16:rowId xmlns:a16="http://schemas.microsoft.com/office/drawing/2014/main" xmlns="" val="10011"/>
+                  </a:ext>
+                </a:extLst>
               </a:tr>
               <a:tr h="306675">
                 <a:tc>
@@ -19339,6 +19753,11 @@
                     </a:solidFill>
                   </a:tcPr>
                 </a:tc>
+                <a:extLst>
+                  <a:ext uri="{0D108BD9-81ED-4DB2-BD59-A6C34878D82A}">
+                    <a16:rowId xmlns:a16="http://schemas.microsoft.com/office/drawing/2014/main" xmlns="" val="10012"/>
+                  </a:ext>
+                </a:extLst>
               </a:tr>
               <a:tr h="306675">
                 <a:tc>
@@ -19497,6 +19916,11 @@
                     </a:solidFill>
                   </a:tcPr>
                 </a:tc>
+                <a:extLst>
+                  <a:ext uri="{0D108BD9-81ED-4DB2-BD59-A6C34878D82A}">
+                    <a16:rowId xmlns:a16="http://schemas.microsoft.com/office/drawing/2014/main" xmlns="" val="10013"/>
+                  </a:ext>
+                </a:extLst>
               </a:tr>
               <a:tr h="306675">
                 <a:tc>
@@ -19655,6 +20079,11 @@
                     </a:solidFill>
                   </a:tcPr>
                 </a:tc>
+                <a:extLst>
+                  <a:ext uri="{0D108BD9-81ED-4DB2-BD59-A6C34878D82A}">
+                    <a16:rowId xmlns:a16="http://schemas.microsoft.com/office/drawing/2014/main" xmlns="" val="10014"/>
+                  </a:ext>
+                </a:extLst>
               </a:tr>
               <a:tr h="306675">
                 <a:tc>
@@ -19813,6 +20242,11 @@
                     </a:solidFill>
                   </a:tcPr>
                 </a:tc>
+                <a:extLst>
+                  <a:ext uri="{0D108BD9-81ED-4DB2-BD59-A6C34878D82A}">
+                    <a16:rowId xmlns:a16="http://schemas.microsoft.com/office/drawing/2014/main" xmlns="" val="10015"/>
+                  </a:ext>
+                </a:extLst>
               </a:tr>
             </a:tbl>
           </a:graphicData>
@@ -19881,14 +20315,14 @@
             <p:ph idx="1"/>
             <p:extLst>
               <p:ext uri="{D42A27DB-BD31-4B8C-83A1-F6EECF244321}">
-                <p14:modId xmlns:p14="http://schemas.microsoft.com/office/powerpoint/2010/main" val="1001319441"/>
+                <p14:modId xmlns:p14="http://schemas.microsoft.com/office/powerpoint/2010/main" val="1382428448"/>
               </p:ext>
             </p:extLst>
           </p:nvPr>
         </p:nvGraphicFramePr>
         <p:xfrm>
           <a:off x="280988" y="1025525"/>
-          <a:ext cx="8582024" cy="3860800"/>
+          <a:ext cx="8582024" cy="3764280"/>
         </p:xfrm>
         <a:graphic>
           <a:graphicData uri="http://schemas.openxmlformats.org/drawingml/2006/table">
@@ -19897,10 +20331,34 @@
                 <a:tableStyleId>{5940675A-B579-460E-94D1-54222C63F5DA}</a:tableStyleId>
               </a:tblPr>
               <a:tblGrid>
-                <a:gridCol w="2145506"/>
-                <a:gridCol w="2145506"/>
-                <a:gridCol w="2145506"/>
-                <a:gridCol w="2145506"/>
+                <a:gridCol w="2145506">
+                  <a:extLst>
+                    <a:ext uri="{9D8B030D-6E8A-4147-A177-3AD203B41FA5}">
+                      <a16:colId xmlns:a16="http://schemas.microsoft.com/office/drawing/2014/main" xmlns="" val="20000"/>
+                    </a:ext>
+                  </a:extLst>
+                </a:gridCol>
+                <a:gridCol w="2145506">
+                  <a:extLst>
+                    <a:ext uri="{9D8B030D-6E8A-4147-A177-3AD203B41FA5}">
+                      <a16:colId xmlns:a16="http://schemas.microsoft.com/office/drawing/2014/main" xmlns="" val="20001"/>
+                    </a:ext>
+                  </a:extLst>
+                </a:gridCol>
+                <a:gridCol w="2145506">
+                  <a:extLst>
+                    <a:ext uri="{9D8B030D-6E8A-4147-A177-3AD203B41FA5}">
+                      <a16:colId xmlns:a16="http://schemas.microsoft.com/office/drawing/2014/main" xmlns="" val="20002"/>
+                    </a:ext>
+                  </a:extLst>
+                </a:gridCol>
+                <a:gridCol w="2145506">
+                  <a:extLst>
+                    <a:ext uri="{9D8B030D-6E8A-4147-A177-3AD203B41FA5}">
+                      <a16:colId xmlns:a16="http://schemas.microsoft.com/office/drawing/2014/main" xmlns="" val="20003"/>
+                    </a:ext>
+                  </a:extLst>
+                </a:gridCol>
               </a:tblGrid>
               <a:tr h="370840">
                 <a:tc>
@@ -20023,6 +20481,11 @@
                     </a:solidFill>
                   </a:tcPr>
                 </a:tc>
+                <a:extLst>
+                  <a:ext uri="{0D108BD9-81ED-4DB2-BD59-A6C34878D82A}">
+                    <a16:rowId xmlns:a16="http://schemas.microsoft.com/office/drawing/2014/main" xmlns="" val="10000"/>
+                  </a:ext>
+                </a:extLst>
               </a:tr>
               <a:tr h="370840">
                 <a:tc>
@@ -20189,6 +20652,11 @@
                     </a:solidFill>
                   </a:tcPr>
                 </a:tc>
+                <a:extLst>
+                  <a:ext uri="{0D108BD9-81ED-4DB2-BD59-A6C34878D82A}">
+                    <a16:rowId xmlns:a16="http://schemas.microsoft.com/office/drawing/2014/main" xmlns="" val="10001"/>
+                  </a:ext>
+                </a:extLst>
               </a:tr>
               <a:tr h="370840">
                 <a:tc>
@@ -20381,6 +20849,11 @@
                     </a:solidFill>
                   </a:tcPr>
                 </a:tc>
+                <a:extLst>
+                  <a:ext uri="{0D108BD9-81ED-4DB2-BD59-A6C34878D82A}">
+                    <a16:rowId xmlns:a16="http://schemas.microsoft.com/office/drawing/2014/main" xmlns="" val="10002"/>
+                  </a:ext>
+                </a:extLst>
               </a:tr>
               <a:tr h="370840">
                 <a:tc>
@@ -20517,6 +20990,11 @@
                     </a:solidFill>
                   </a:tcPr>
                 </a:tc>
+                <a:extLst>
+                  <a:ext uri="{0D108BD9-81ED-4DB2-BD59-A6C34878D82A}">
+                    <a16:rowId xmlns:a16="http://schemas.microsoft.com/office/drawing/2014/main" xmlns="" val="10003"/>
+                  </a:ext>
+                </a:extLst>
               </a:tr>
               <a:tr h="370840">
                 <a:tc>
@@ -20679,6 +21157,11 @@
                     </a:solidFill>
                   </a:tcPr>
                 </a:tc>
+                <a:extLst>
+                  <a:ext uri="{0D108BD9-81ED-4DB2-BD59-A6C34878D82A}">
+                    <a16:rowId xmlns:a16="http://schemas.microsoft.com/office/drawing/2014/main" xmlns="" val="10004"/>
+                  </a:ext>
+                </a:extLst>
               </a:tr>
               <a:tr h="370840">
                 <a:tc>
@@ -20825,6 +21308,11 @@
                     </a:solidFill>
                   </a:tcPr>
                 </a:tc>
+                <a:extLst>
+                  <a:ext uri="{0D108BD9-81ED-4DB2-BD59-A6C34878D82A}">
+                    <a16:rowId xmlns:a16="http://schemas.microsoft.com/office/drawing/2014/main" xmlns="" val="10005"/>
+                  </a:ext>
+                </a:extLst>
               </a:tr>
               <a:tr h="370840">
                 <a:tc>
@@ -20963,7 +21451,23 @@
                       </a:r>
                     </a:p>
                     <a:p>
-                      <a:pPr latinLnBrk="1"/>
+                      <a:pPr marL="0" marR="0" indent="0" algn="l" defTabSz="914400" rtl="0" eaLnBrk="1" fontAlgn="auto" latinLnBrk="1" hangingPunct="1">
+                        <a:lnSpc>
+                          <a:spcPct val="100000"/>
+                        </a:lnSpc>
+                        <a:spcBef>
+                          <a:spcPts val="0"/>
+                        </a:spcBef>
+                        <a:spcAft>
+                          <a:spcPts val="0"/>
+                        </a:spcAft>
+                        <a:buClrTx/>
+                        <a:buSzTx/>
+                        <a:buFontTx/>
+                        <a:buNone/>
+                        <a:tabLst/>
+                        <a:defRPr/>
+                      </a:pPr>
                       <a:r>
                         <a:rPr lang="en-US" altLang="ko-KR" sz="1200" b="0" baseline="0" dirty="0" smtClean="0">
                           <a:solidFill>
@@ -20995,7 +21499,7 @@
                         <a:t>usecase</a:t>
                       </a:r>
                       <a:r>
-                        <a:rPr lang="en-US" altLang="ko-KR" sz="1200" b="0" baseline="0" smtClean="0">
+                        <a:rPr lang="en-US" altLang="ko-KR" sz="1200" b="0" baseline="0" dirty="0" smtClean="0">
                           <a:solidFill>
                             <a:schemeClr val="tx1"/>
                           </a:solidFill>
@@ -21005,7 +21509,7 @@
                         <a:t> id </a:t>
                       </a:r>
                       <a:r>
-                        <a:rPr lang="ko-KR" altLang="en-US" sz="1200" b="0" baseline="0" smtClean="0">
+                        <a:rPr lang="ko-KR" altLang="en-US" sz="1200" b="0" baseline="0" dirty="0" smtClean="0">
                           <a:solidFill>
                             <a:schemeClr val="tx1"/>
                           </a:solidFill>
@@ -21013,6 +21517,16 @@
                           <a:ea typeface="맑은 고딕" pitchFamily="50" charset="-127"/>
                         </a:rPr>
                         <a:t>추가</a:t>
+                      </a:r>
+                      <a:r>
+                        <a:rPr lang="en-US" altLang="ko-KR" sz="1200" b="0" baseline="0" dirty="0" smtClean="0">
+                          <a:solidFill>
+                            <a:schemeClr val="tx1"/>
+                          </a:solidFill>
+                          <a:latin typeface="맑은 고딕" pitchFamily="50" charset="-127"/>
+                          <a:ea typeface="맑은 고딕" pitchFamily="50" charset="-127"/>
+                        </a:rPr>
+                        <a:t>,</a:t>
                       </a:r>
                       <a:endParaRPr lang="en-US" altLang="ko-KR" sz="1200" b="0" baseline="0" dirty="0" smtClean="0">
                         <a:solidFill>
@@ -21062,31 +21576,8 @@
                           <a:latin typeface="맑은 고딕" pitchFamily="50" charset="-127"/>
                           <a:ea typeface="맑은 고딕" pitchFamily="50" charset="-127"/>
                         </a:rPr>
-                        <a:t>출력 정보일람 </a:t>
-                      </a:r>
-                      <a:r>
-                        <a:rPr lang="ko-KR" altLang="en-US" sz="1200" b="0" dirty="0" smtClean="0">
-                          <a:solidFill>
-                            <a:schemeClr val="tx1"/>
-                          </a:solidFill>
-                          <a:latin typeface="맑은 고딕" pitchFamily="50" charset="-127"/>
-                          <a:ea typeface="맑은 고딕" pitchFamily="50" charset="-127"/>
-                        </a:rPr>
-                        <a:t>수정</a:t>
-                      </a:r>
-                      <a:r>
-                        <a:rPr lang="en-US" altLang="ko-KR" sz="1200" b="0" dirty="0" smtClean="0">
-                          <a:solidFill>
-                            <a:schemeClr val="tx1"/>
-                          </a:solidFill>
-                          <a:latin typeface="맑은 고딕" pitchFamily="50" charset="-127"/>
-                          <a:ea typeface="맑은 고딕" pitchFamily="50" charset="-127"/>
-                        </a:rPr>
-                        <a:t>,</a:t>
-                      </a:r>
-                    </a:p>
-                    <a:p>
-                      <a:pPr latinLnBrk="1"/>
+                        <a:t>출력 정보일람 수정</a:t>
+                      </a:r>
                       <a:endParaRPr lang="ko-KR" altLang="en-US" sz="1200" b="0" dirty="0">
                         <a:solidFill>
                           <a:schemeClr val="tx1"/>
@@ -21133,6 +21624,11 @@
                     </a:solidFill>
                   </a:tcPr>
                 </a:tc>
+                <a:extLst>
+                  <a:ext uri="{0D108BD9-81ED-4DB2-BD59-A6C34878D82A}">
+                    <a16:rowId xmlns:a16="http://schemas.microsoft.com/office/drawing/2014/main" xmlns="" val="10006"/>
+                  </a:ext>
+                </a:extLst>
               </a:tr>
               <a:tr h="370840">
                 <a:tc>
@@ -21157,6 +21653,16 @@
                         <a:tabLst/>
                         <a:defRPr/>
                       </a:pPr>
+                      <a:r>
+                        <a:rPr lang="en-US" altLang="ko-KR" sz="1200" b="0" dirty="0" smtClean="0">
+                          <a:solidFill>
+                            <a:schemeClr val="tx1"/>
+                          </a:solidFill>
+                          <a:latin typeface="맑은 고딕" pitchFamily="50" charset="-127"/>
+                          <a:ea typeface="맑은 고딕" pitchFamily="50" charset="-127"/>
+                        </a:rPr>
+                        <a:t>17.05.26</a:t>
+                      </a:r>
                       <a:endParaRPr lang="ko-KR" altLang="en-US" sz="1200" b="0" dirty="0" smtClean="0">
                         <a:solidFill>
                           <a:schemeClr val="tx1"/>
@@ -21178,6 +21684,16 @@
                     <a:lstStyle/>
                     <a:p>
                       <a:pPr algn="ctr" latinLnBrk="1"/>
+                      <a:r>
+                        <a:rPr lang="en-US" altLang="ko-KR" sz="1200" b="0" dirty="0" smtClean="0">
+                          <a:solidFill>
+                            <a:schemeClr val="tx1"/>
+                          </a:solidFill>
+                          <a:latin typeface="맑은 고딕" pitchFamily="50" charset="-127"/>
+                          <a:ea typeface="맑은 고딕" pitchFamily="50" charset="-127"/>
+                        </a:rPr>
+                        <a:t>V0.6</a:t>
+                      </a:r>
                       <a:endParaRPr lang="ko-KR" altLang="en-US" sz="1200" b="0" dirty="0">
                         <a:solidFill>
                           <a:schemeClr val="tx1"/>
@@ -21199,6 +21715,79 @@
                     <a:lstStyle/>
                     <a:p>
                       <a:pPr latinLnBrk="1"/>
+                      <a:r>
+                        <a:rPr lang="ko-KR" altLang="en-US" sz="1200" b="0" dirty="0" smtClean="0">
+                          <a:solidFill>
+                            <a:schemeClr val="tx1"/>
+                          </a:solidFill>
+                          <a:latin typeface="맑은 고딕" pitchFamily="50" charset="-127"/>
+                          <a:ea typeface="맑은 고딕" pitchFamily="50" charset="-127"/>
+                        </a:rPr>
+                        <a:t>파일명 수정</a:t>
+                      </a:r>
+                      <a:r>
+                        <a:rPr lang="en-US" altLang="ko-KR" sz="1200" b="0" dirty="0" smtClean="0">
+                          <a:solidFill>
+                            <a:schemeClr val="tx1"/>
+                          </a:solidFill>
+                          <a:latin typeface="맑은 고딕" pitchFamily="50" charset="-127"/>
+                          <a:ea typeface="맑은 고딕" pitchFamily="50" charset="-127"/>
+                        </a:rPr>
+                        <a:t>, </a:t>
+                      </a:r>
+                      <a:r>
+                        <a:rPr lang="ko-KR" altLang="en-US" sz="1200" b="0" dirty="0" err="1" smtClean="0">
+                          <a:solidFill>
+                            <a:schemeClr val="tx1"/>
+                          </a:solidFill>
+                          <a:latin typeface="맑은 고딕" pitchFamily="50" charset="-127"/>
+                          <a:ea typeface="맑은 고딕" pitchFamily="50" charset="-127"/>
+                        </a:rPr>
+                        <a:t>팀명</a:t>
+                      </a:r>
+                      <a:r>
+                        <a:rPr lang="ko-KR" altLang="en-US" sz="1200" b="0" dirty="0" smtClean="0">
+                          <a:solidFill>
+                            <a:schemeClr val="tx1"/>
+                          </a:solidFill>
+                          <a:latin typeface="맑은 고딕" pitchFamily="50" charset="-127"/>
+                          <a:ea typeface="맑은 고딕" pitchFamily="50" charset="-127"/>
+                        </a:rPr>
+                        <a:t> 수정</a:t>
+                      </a:r>
+                      <a:r>
+                        <a:rPr lang="en-US" altLang="ko-KR" sz="1200" b="0" dirty="0" smtClean="0">
+                          <a:solidFill>
+                            <a:schemeClr val="tx1"/>
+                          </a:solidFill>
+                          <a:latin typeface="맑은 고딕" pitchFamily="50" charset="-127"/>
+                          <a:ea typeface="맑은 고딕" pitchFamily="50" charset="-127"/>
+                        </a:rPr>
+                        <a:t>,</a:t>
+                      </a:r>
+                      <a:r>
+                        <a:rPr lang="en-US" altLang="ko-KR" sz="1200" b="0" baseline="0" dirty="0" smtClean="0">
+                          <a:solidFill>
+                            <a:schemeClr val="tx1"/>
+                          </a:solidFill>
+                          <a:latin typeface="맑은 고딕" pitchFamily="50" charset="-127"/>
+                          <a:ea typeface="맑은 고딕" pitchFamily="50" charset="-127"/>
+                        </a:rPr>
+                        <a:t> </a:t>
+                      </a:r>
+                    </a:p>
+                    <a:p>
+                      <a:pPr latinLnBrk="1"/>
+                      <a:r>
+                        <a:rPr lang="ko-KR" altLang="en-US" sz="1200" b="0" dirty="0" smtClean="0">
+                          <a:solidFill>
+                            <a:schemeClr val="tx1"/>
+                          </a:solidFill>
+                          <a:latin typeface="맑은 고딕" pitchFamily="50" charset="-127"/>
+                          <a:ea typeface="맑은 고딕" pitchFamily="50" charset="-127"/>
+                        </a:rPr>
+                        <a:t>버전 명시 통일</a:t>
+                      </a:r>
                       <a:endParaRPr lang="ko-KR" altLang="en-US" sz="1200" b="0" dirty="0">
                         <a:solidFill>
                           <a:schemeClr val="tx1"/>
@@ -21220,6 +21809,16 @@
                     <a:lstStyle/>
                     <a:p>
                       <a:pPr algn="ctr" latinLnBrk="1"/>
+                      <a:r>
+                        <a:rPr lang="ko-KR" altLang="en-US" sz="1200" b="0" dirty="0" smtClean="0">
+                          <a:solidFill>
+                            <a:schemeClr val="tx1"/>
+                          </a:solidFill>
+                          <a:latin typeface="맑은 고딕" pitchFamily="50" charset="-127"/>
+                          <a:ea typeface="맑은 고딕" pitchFamily="50" charset="-127"/>
+                        </a:rPr>
+                        <a:t>김정원</a:t>
+                      </a:r>
                       <a:endParaRPr lang="ko-KR" altLang="en-US" sz="1200" b="0" dirty="0">
                         <a:solidFill>
                           <a:schemeClr val="tx1"/>
@@ -21235,6 +21834,11 @@
                     </a:solidFill>
                   </a:tcPr>
                 </a:tc>
+                <a:extLst>
+                  <a:ext uri="{0D108BD9-81ED-4DB2-BD59-A6C34878D82A}">
+                    <a16:rowId xmlns:a16="http://schemas.microsoft.com/office/drawing/2014/main" xmlns="" val="10007"/>
+                  </a:ext>
+                </a:extLst>
               </a:tr>
             </a:tbl>
           </a:graphicData>
@@ -21258,8 +21862,17 @@
             <a:pPr algn="r"/>
             <a:r>
               <a:rPr lang="en-US" altLang="ko-KR" dirty="0"/>
-              <a:t>Eight Eureka</a:t>
+              <a:t>Eight </a:t>
             </a:r>
+            <a:r>
+              <a:rPr lang="en-US" altLang="ko-KR" dirty="0" smtClean="0"/>
+              <a:t>Eureka 8</a:t>
+            </a:r>
+            <a:r>
+              <a:rPr lang="ko-KR" altLang="en-US" dirty="0" smtClean="0"/>
+              <a:t>조</a:t>
+            </a:r>
+            <a:endParaRPr lang="en-US" altLang="ko-KR" dirty="0"/>
           </a:p>
         </p:txBody>
       </p:sp>
@@ -21374,8 +21987,17 @@
             <a:pPr algn="r"/>
             <a:r>
               <a:rPr lang="en-US" altLang="ko-KR" dirty="0"/>
-              <a:t>Eight Eureka</a:t>
+              <a:t>Eight </a:t>
             </a:r>
+            <a:r>
+              <a:rPr lang="en-US" altLang="ko-KR" dirty="0" smtClean="0"/>
+              <a:t>Eureka 8</a:t>
+            </a:r>
+            <a:r>
+              <a:rPr lang="ko-KR" altLang="en-US" dirty="0" smtClean="0"/>
+              <a:t>조</a:t>
+            </a:r>
+            <a:endParaRPr lang="en-US" altLang="ko-KR" dirty="0"/>
           </a:p>
         </p:txBody>
       </p:sp>
@@ -21539,8 +22161,13 @@
             <a:pPr algn="r"/>
             <a:r>
               <a:rPr lang="en-US" altLang="ko-KR" dirty="0"/>
-              <a:t>Eight Eureka</a:t>
+              <a:t>Eight Eureka 8</a:t>
             </a:r>
+            <a:r>
+              <a:rPr lang="ko-KR" altLang="en-US" dirty="0"/>
+              <a:t>조</a:t>
+            </a:r>
+            <a:endParaRPr lang="en-US" altLang="ko-KR" dirty="0"/>
           </a:p>
         </p:txBody>
       </p:sp>
@@ -21656,8 +22283,13 @@
             <a:pPr algn="r"/>
             <a:r>
               <a:rPr lang="en-US" altLang="ko-KR" dirty="0"/>
-              <a:t>Eight Eureka</a:t>
+              <a:t>Eight Eureka 8</a:t>
             </a:r>
+            <a:r>
+              <a:rPr lang="ko-KR" altLang="en-US" dirty="0"/>
+              <a:t>조</a:t>
+            </a:r>
+            <a:endParaRPr lang="en-US" altLang="ko-KR" dirty="0"/>
           </a:p>
         </p:txBody>
       </p:sp>
@@ -22752,54 +23384,7 @@
                 </a:rPr>
                 <a:t>.</a:t>
               </a:r>
-            </a:p>
-            <a:p>
-              <a:pPr marL="171450" indent="-171450" algn="just">
-                <a:buFont typeface="Arial" pitchFamily="34" charset="0"/>
-                <a:buChar char="•"/>
-              </a:pPr>
               <a:endParaRPr lang="en-US" altLang="ko-KR" sz="1050" dirty="0">
-                <a:latin typeface="맑은 고딕" pitchFamily="50" charset="-127"/>
-                <a:ea typeface="맑은 고딕" pitchFamily="50" charset="-127"/>
-              </a:endParaRPr>
-            </a:p>
-            <a:p>
-              <a:pPr algn="just"/>
-              <a:endParaRPr lang="en-US" altLang="ko-KR" sz="1050" dirty="0" smtClean="0">
-                <a:latin typeface="맑은 고딕" pitchFamily="50" charset="-127"/>
-                <a:ea typeface="맑은 고딕" pitchFamily="50" charset="-127"/>
-              </a:endParaRPr>
-            </a:p>
-            <a:p>
-              <a:pPr algn="just"/>
-              <a:endParaRPr lang="en-US" altLang="ko-KR" sz="1050" dirty="0">
-                <a:latin typeface="맑은 고딕" pitchFamily="50" charset="-127"/>
-                <a:ea typeface="맑은 고딕" pitchFamily="50" charset="-127"/>
-              </a:endParaRPr>
-            </a:p>
-            <a:p>
-              <a:pPr algn="just"/>
-              <a:endParaRPr lang="en-US" altLang="ko-KR" sz="1050" dirty="0" smtClean="0">
-                <a:latin typeface="맑은 고딕" pitchFamily="50" charset="-127"/>
-                <a:ea typeface="맑은 고딕" pitchFamily="50" charset="-127"/>
-              </a:endParaRPr>
-            </a:p>
-            <a:p>
-              <a:pPr algn="just">
-                <a:buFont typeface="Arial" pitchFamily="34" charset="0"/>
-                <a:buChar char="•"/>
-              </a:pPr>
-              <a:endParaRPr lang="en-US" altLang="ko-KR" sz="1050" dirty="0">
-                <a:latin typeface="맑은 고딕" pitchFamily="50" charset="-127"/>
-                <a:ea typeface="맑은 고딕" pitchFamily="50" charset="-127"/>
-              </a:endParaRPr>
-            </a:p>
-            <a:p>
-              <a:pPr algn="just">
-                <a:buFont typeface="Arial" pitchFamily="34" charset="0"/>
-                <a:buChar char="•"/>
-              </a:pPr>
-              <a:endParaRPr lang="ko-KR" altLang="en-US" sz="1050" dirty="0">
                 <a:latin typeface="맑은 고딕" pitchFamily="50" charset="-127"/>
                 <a:ea typeface="맑은 고딕" pitchFamily="50" charset="-127"/>
               </a:endParaRPr>
@@ -22816,7 +23401,7 @@
           <p:nvPr>
             <p:extLst>
               <p:ext uri="{D42A27DB-BD31-4B8C-83A1-F6EECF244321}">
-                <p14:modId xmlns:p14="http://schemas.microsoft.com/office/powerpoint/2010/main" val="1853906559"/>
+                <p14:modId xmlns:p14="http://schemas.microsoft.com/office/powerpoint/2010/main" val="655010319"/>
               </p:ext>
             </p:extLst>
           </p:nvPr>
@@ -22830,12 +23415,48 @@
             <a:tbl>
               <a:tblPr/>
               <a:tblGrid>
-                <a:gridCol w="1024554"/>
-                <a:gridCol w="2983884"/>
-                <a:gridCol w="1196090"/>
-                <a:gridCol w="1859283"/>
-                <a:gridCol w="597313"/>
-                <a:gridCol w="1272218"/>
+                <a:gridCol w="1024554">
+                  <a:extLst>
+                    <a:ext uri="{9D8B030D-6E8A-4147-A177-3AD203B41FA5}">
+                      <a16:colId xmlns:a16="http://schemas.microsoft.com/office/drawing/2014/main" xmlns="" val="20000"/>
+                    </a:ext>
+                  </a:extLst>
+                </a:gridCol>
+                <a:gridCol w="2983884">
+                  <a:extLst>
+                    <a:ext uri="{9D8B030D-6E8A-4147-A177-3AD203B41FA5}">
+                      <a16:colId xmlns:a16="http://schemas.microsoft.com/office/drawing/2014/main" xmlns="" val="20001"/>
+                    </a:ext>
+                  </a:extLst>
+                </a:gridCol>
+                <a:gridCol w="1196090">
+                  <a:extLst>
+                    <a:ext uri="{9D8B030D-6E8A-4147-A177-3AD203B41FA5}">
+                      <a16:colId xmlns:a16="http://schemas.microsoft.com/office/drawing/2014/main" xmlns="" val="20002"/>
+                    </a:ext>
+                  </a:extLst>
+                </a:gridCol>
+                <a:gridCol w="1859283">
+                  <a:extLst>
+                    <a:ext uri="{9D8B030D-6E8A-4147-A177-3AD203B41FA5}">
+                      <a16:colId xmlns:a16="http://schemas.microsoft.com/office/drawing/2014/main" xmlns="" val="20003"/>
+                    </a:ext>
+                  </a:extLst>
+                </a:gridCol>
+                <a:gridCol w="597313">
+                  <a:extLst>
+                    <a:ext uri="{9D8B030D-6E8A-4147-A177-3AD203B41FA5}">
+                      <a16:colId xmlns:a16="http://schemas.microsoft.com/office/drawing/2014/main" xmlns="" val="20004"/>
+                    </a:ext>
+                  </a:extLst>
+                </a:gridCol>
+                <a:gridCol w="1272218">
+                  <a:extLst>
+                    <a:ext uri="{9D8B030D-6E8A-4147-A177-3AD203B41FA5}">
+                      <a16:colId xmlns:a16="http://schemas.microsoft.com/office/drawing/2014/main" xmlns="" val="20005"/>
+                    </a:ext>
+                  </a:extLst>
+                </a:gridCol>
               </a:tblGrid>
               <a:tr h="299619">
                 <a:tc>
@@ -23423,6 +24044,11 @@
                     <a:noFill/>
                   </a:tcPr>
                 </a:tc>
+                <a:extLst>
+                  <a:ext uri="{0D108BD9-81ED-4DB2-BD59-A6C34878D82A}">
+                    <a16:rowId xmlns:a16="http://schemas.microsoft.com/office/drawing/2014/main" xmlns="" val="10000"/>
+                  </a:ext>
+                </a:extLst>
               </a:tr>
               <a:tr h="297106">
                 <a:tc>
@@ -23932,7 +24558,7 @@
                           <a:latin typeface="맑은 고딕" pitchFamily="50" charset="-127"/>
                           <a:ea typeface="맑은 고딕" pitchFamily="50" charset="-127"/>
                         </a:rPr>
-                        <a:t>2017.05.26 (V1.0)</a:t>
+                        <a:t>2017.05.26 (V0.6)</a:t>
                       </a:r>
                       <a:endParaRPr lang="ko-KR" altLang="en-US" sz="900" b="0" dirty="0">
                         <a:solidFill>
@@ -23989,6 +24615,11 @@
                     <a:noFill/>
                   </a:tcPr>
                 </a:tc>
+                <a:extLst>
+                  <a:ext uri="{0D108BD9-81ED-4DB2-BD59-A6C34878D82A}">
+                    <a16:rowId xmlns:a16="http://schemas.microsoft.com/office/drawing/2014/main" xmlns="" val="10001"/>
+                  </a:ext>
+                </a:extLst>
               </a:tr>
               <a:tr h="297106">
                 <a:tc>
@@ -24508,6 +25139,11 @@
                     <a:noFill/>
                   </a:tcPr>
                 </a:tc>
+                <a:extLst>
+                  <a:ext uri="{0D108BD9-81ED-4DB2-BD59-A6C34878D82A}">
+                    <a16:rowId xmlns:a16="http://schemas.microsoft.com/office/drawing/2014/main" xmlns="" val="10002"/>
+                  </a:ext>
+                </a:extLst>
               </a:tr>
             </a:tbl>
           </a:graphicData>
@@ -25035,8 +25671,13 @@
             <a:pPr algn="r"/>
             <a:r>
               <a:rPr lang="en-US" altLang="ko-KR" dirty="0"/>
-              <a:t>Eight Eureka</a:t>
+              <a:t>Eight Eureka 8</a:t>
             </a:r>
+            <a:r>
+              <a:rPr lang="ko-KR" altLang="en-US" dirty="0"/>
+              <a:t>조</a:t>
+            </a:r>
+            <a:endParaRPr lang="en-US" altLang="ko-KR" dirty="0"/>
           </a:p>
         </p:txBody>
       </p:sp>
@@ -25049,7 +25690,7 @@
           <p:nvPr>
             <p:extLst>
               <p:ext uri="{D42A27DB-BD31-4B8C-83A1-F6EECF244321}">
-                <p14:modId xmlns:p14="http://schemas.microsoft.com/office/powerpoint/2010/main" val="4051162915"/>
+                <p14:modId xmlns:p14="http://schemas.microsoft.com/office/powerpoint/2010/main" val="2463720393"/>
               </p:ext>
             </p:extLst>
           </p:nvPr>
@@ -25063,12 +25704,48 @@
             <a:tbl>
               <a:tblPr/>
               <a:tblGrid>
-                <a:gridCol w="1024554"/>
-                <a:gridCol w="2983884"/>
-                <a:gridCol w="1196090"/>
-                <a:gridCol w="1859283"/>
-                <a:gridCol w="597313"/>
-                <a:gridCol w="1272218"/>
+                <a:gridCol w="1024554">
+                  <a:extLst>
+                    <a:ext uri="{9D8B030D-6E8A-4147-A177-3AD203B41FA5}">
+                      <a16:colId xmlns:a16="http://schemas.microsoft.com/office/drawing/2014/main" xmlns="" val="20000"/>
+                    </a:ext>
+                  </a:extLst>
+                </a:gridCol>
+                <a:gridCol w="2983884">
+                  <a:extLst>
+                    <a:ext uri="{9D8B030D-6E8A-4147-A177-3AD203B41FA5}">
+                      <a16:colId xmlns:a16="http://schemas.microsoft.com/office/drawing/2014/main" xmlns="" val="20001"/>
+                    </a:ext>
+                  </a:extLst>
+                </a:gridCol>
+                <a:gridCol w="1196090">
+                  <a:extLst>
+                    <a:ext uri="{9D8B030D-6E8A-4147-A177-3AD203B41FA5}">
+                      <a16:colId xmlns:a16="http://schemas.microsoft.com/office/drawing/2014/main" xmlns="" val="20002"/>
+                    </a:ext>
+                  </a:extLst>
+                </a:gridCol>
+                <a:gridCol w="1859283">
+                  <a:extLst>
+                    <a:ext uri="{9D8B030D-6E8A-4147-A177-3AD203B41FA5}">
+                      <a16:colId xmlns:a16="http://schemas.microsoft.com/office/drawing/2014/main" xmlns="" val="20003"/>
+                    </a:ext>
+                  </a:extLst>
+                </a:gridCol>
+                <a:gridCol w="597313">
+                  <a:extLst>
+                    <a:ext uri="{9D8B030D-6E8A-4147-A177-3AD203B41FA5}">
+                      <a16:colId xmlns:a16="http://schemas.microsoft.com/office/drawing/2014/main" xmlns="" val="20004"/>
+                    </a:ext>
+                  </a:extLst>
+                </a:gridCol>
+                <a:gridCol w="1272218">
+                  <a:extLst>
+                    <a:ext uri="{9D8B030D-6E8A-4147-A177-3AD203B41FA5}">
+                      <a16:colId xmlns:a16="http://schemas.microsoft.com/office/drawing/2014/main" xmlns="" val="20005"/>
+                    </a:ext>
+                  </a:extLst>
+                </a:gridCol>
               </a:tblGrid>
               <a:tr h="299619">
                 <a:tc>
@@ -25657,6 +26334,11 @@
                     <a:noFill/>
                   </a:tcPr>
                 </a:tc>
+                <a:extLst>
+                  <a:ext uri="{0D108BD9-81ED-4DB2-BD59-A6C34878D82A}">
+                    <a16:rowId xmlns:a16="http://schemas.microsoft.com/office/drawing/2014/main" xmlns="" val="10000"/>
+                  </a:ext>
+                </a:extLst>
               </a:tr>
               <a:tr h="297106">
                 <a:tc>
@@ -26168,7 +26850,7 @@
                           <a:latin typeface="맑은 고딕" pitchFamily="50" charset="-127"/>
                           <a:ea typeface="맑은 고딕" pitchFamily="50" charset="-127"/>
                         </a:rPr>
-                        <a:t>2017.05.26 (V1.0)</a:t>
+                        <a:t>2017.05.26 (V0.6)</a:t>
                       </a:r>
                       <a:endParaRPr lang="ko-KR" altLang="en-US" sz="900" b="0" dirty="0">
                         <a:solidFill>
@@ -26225,6 +26907,11 @@
                     <a:noFill/>
                   </a:tcPr>
                 </a:tc>
+                <a:extLst>
+                  <a:ext uri="{0D108BD9-81ED-4DB2-BD59-A6C34878D82A}">
+                    <a16:rowId xmlns:a16="http://schemas.microsoft.com/office/drawing/2014/main" xmlns="" val="10001"/>
+                  </a:ext>
+                </a:extLst>
               </a:tr>
               <a:tr h="297106">
                 <a:tc>
@@ -26745,6 +27432,11 @@
                     <a:noFill/>
                   </a:tcPr>
                 </a:tc>
+                <a:extLst>
+                  <a:ext uri="{0D108BD9-81ED-4DB2-BD59-A6C34878D82A}">
+                    <a16:rowId xmlns:a16="http://schemas.microsoft.com/office/drawing/2014/main" xmlns="" val="10002"/>
+                  </a:ext>
+                </a:extLst>
               </a:tr>
             </a:tbl>
           </a:graphicData>
@@ -26775,10 +27467,34 @@
                 <a:tableStyleId>{5940675A-B579-460E-94D1-54222C63F5DA}</a:tableStyleId>
               </a:tblPr>
               <a:tblGrid>
-                <a:gridCol w="504000"/>
-                <a:gridCol w="504000"/>
-                <a:gridCol w="1521016"/>
-                <a:gridCol w="1521016"/>
+                <a:gridCol w="504000">
+                  <a:extLst>
+                    <a:ext uri="{9D8B030D-6E8A-4147-A177-3AD203B41FA5}">
+                      <a16:colId xmlns:a16="http://schemas.microsoft.com/office/drawing/2014/main" xmlns="" val="20000"/>
+                    </a:ext>
+                  </a:extLst>
+                </a:gridCol>
+                <a:gridCol w="504000">
+                  <a:extLst>
+                    <a:ext uri="{9D8B030D-6E8A-4147-A177-3AD203B41FA5}">
+                      <a16:colId xmlns:a16="http://schemas.microsoft.com/office/drawing/2014/main" xmlns="" val="20001"/>
+                    </a:ext>
+                  </a:extLst>
+                </a:gridCol>
+                <a:gridCol w="1521016">
+                  <a:extLst>
+                    <a:ext uri="{9D8B030D-6E8A-4147-A177-3AD203B41FA5}">
+                      <a16:colId xmlns:a16="http://schemas.microsoft.com/office/drawing/2014/main" xmlns="" val="20002"/>
+                    </a:ext>
+                  </a:extLst>
+                </a:gridCol>
+                <a:gridCol w="1521016">
+                  <a:extLst>
+                    <a:ext uri="{9D8B030D-6E8A-4147-A177-3AD203B41FA5}">
+                      <a16:colId xmlns:a16="http://schemas.microsoft.com/office/drawing/2014/main" xmlns="" val="20003"/>
+                    </a:ext>
+                  </a:extLst>
+                </a:gridCol>
               </a:tblGrid>
               <a:tr h="301664">
                 <a:tc gridSpan="4">
@@ -26892,6 +27608,11 @@
                   </a:txBody>
                   <a:tcPr/>
                 </a:tc>
+                <a:extLst>
+                  <a:ext uri="{0D108BD9-81ED-4DB2-BD59-A6C34878D82A}">
+                    <a16:rowId xmlns:a16="http://schemas.microsoft.com/office/drawing/2014/main" xmlns="" val="10000"/>
+                  </a:ext>
+                </a:extLst>
               </a:tr>
               <a:tr h="238875">
                 <a:tc>
@@ -27050,6 +27771,11 @@
                     </a:solidFill>
                   </a:tcPr>
                 </a:tc>
+                <a:extLst>
+                  <a:ext uri="{0D108BD9-81ED-4DB2-BD59-A6C34878D82A}">
+                    <a16:rowId xmlns:a16="http://schemas.microsoft.com/office/drawing/2014/main" xmlns="" val="10001"/>
+                  </a:ext>
+                </a:extLst>
               </a:tr>
               <a:tr h="195561">
                 <a:tc>
@@ -27169,6 +27895,11 @@
                     </a:solidFill>
                   </a:tcPr>
                 </a:tc>
+                <a:extLst>
+                  <a:ext uri="{0D108BD9-81ED-4DB2-BD59-A6C34878D82A}">
+                    <a16:rowId xmlns:a16="http://schemas.microsoft.com/office/drawing/2014/main" xmlns="" val="10002"/>
+                  </a:ext>
+                </a:extLst>
               </a:tr>
               <a:tr h="195561">
                 <a:tc>
@@ -27321,6 +28052,11 @@
                     </a:solidFill>
                   </a:tcPr>
                 </a:tc>
+                <a:extLst>
+                  <a:ext uri="{0D108BD9-81ED-4DB2-BD59-A6C34878D82A}">
+                    <a16:rowId xmlns:a16="http://schemas.microsoft.com/office/drawing/2014/main" xmlns="" val="10003"/>
+                  </a:ext>
+                </a:extLst>
               </a:tr>
               <a:tr h="195561">
                 <a:tc>
@@ -27463,6 +28199,11 @@
                     </a:solidFill>
                   </a:tcPr>
                 </a:tc>
+                <a:extLst>
+                  <a:ext uri="{0D108BD9-81ED-4DB2-BD59-A6C34878D82A}">
+                    <a16:rowId xmlns:a16="http://schemas.microsoft.com/office/drawing/2014/main" xmlns="" val="10004"/>
+                  </a:ext>
+                </a:extLst>
               </a:tr>
               <a:tr h="195561">
                 <a:tc>
@@ -27605,6 +28346,11 @@
                     </a:solidFill>
                   </a:tcPr>
                 </a:tc>
+                <a:extLst>
+                  <a:ext uri="{0D108BD9-81ED-4DB2-BD59-A6C34878D82A}">
+                    <a16:rowId xmlns:a16="http://schemas.microsoft.com/office/drawing/2014/main" xmlns="" val="10005"/>
+                  </a:ext>
+                </a:extLst>
               </a:tr>
             </a:tbl>
           </a:graphicData>
@@ -28340,8 +29086,13 @@
             <a:pPr algn="r"/>
             <a:r>
               <a:rPr lang="en-US" altLang="ko-KR" dirty="0"/>
-              <a:t>Eight Eureka</a:t>
+              <a:t>Eight Eureka 8</a:t>
             </a:r>
+            <a:r>
+              <a:rPr lang="ko-KR" altLang="en-US" dirty="0"/>
+              <a:t>조</a:t>
+            </a:r>
+            <a:endParaRPr lang="en-US" altLang="ko-KR" dirty="0"/>
           </a:p>
         </p:txBody>
       </p:sp>
@@ -29391,49 +30142,13 @@
                 <a:t>으로 한다</a:t>
               </a:r>
               <a:r>
-                <a:rPr lang="en-US" altLang="ko-KR" sz="1050" dirty="0">
+                <a:rPr lang="en-US" altLang="ko-KR" sz="1050" dirty="0" smtClean="0">
                   <a:latin typeface="맑은 고딕" pitchFamily="50" charset="-127"/>
                   <a:ea typeface="맑은 고딕" pitchFamily="50" charset="-127"/>
                 </a:rPr>
                 <a:t>.</a:t>
               </a:r>
-            </a:p>
-            <a:p>
-              <a:pPr algn="just"/>
-              <a:endParaRPr lang="en-US" altLang="ko-KR" sz="1050" dirty="0" smtClean="0">
-                <a:solidFill>
-                  <a:sysClr val="windowText" lastClr="000000"/>
-                </a:solidFill>
-                <a:latin typeface="맑은 고딕" pitchFamily="50" charset="-127"/>
-                <a:ea typeface="맑은 고딕" pitchFamily="50" charset="-127"/>
-              </a:endParaRPr>
-            </a:p>
-            <a:p>
-              <a:pPr algn="just"/>
-              <a:endParaRPr lang="en-US" altLang="ko-KR" sz="1050" dirty="0" smtClean="0">
-                <a:solidFill>
-                  <a:sysClr val="windowText" lastClr="000000"/>
-                </a:solidFill>
-                <a:latin typeface="맑은 고딕" pitchFamily="50" charset="-127"/>
-                <a:ea typeface="맑은 고딕" pitchFamily="50" charset="-127"/>
-              </a:endParaRPr>
-            </a:p>
-            <a:p>
-              <a:pPr algn="just"/>
               <a:endParaRPr lang="en-US" altLang="ko-KR" sz="1050" dirty="0">
-                <a:solidFill>
-                  <a:sysClr val="windowText" lastClr="000000"/>
-                </a:solidFill>
-                <a:latin typeface="맑은 고딕" pitchFamily="50" charset="-127"/>
-                <a:ea typeface="맑은 고딕" pitchFamily="50" charset="-127"/>
-              </a:endParaRPr>
-            </a:p>
-            <a:p>
-              <a:pPr algn="just"/>
-              <a:endParaRPr lang="en-US" altLang="ko-KR" sz="1050" dirty="0" smtClean="0">
-                <a:solidFill>
-                  <a:sysClr val="windowText" lastClr="000000"/>
-                </a:solidFill>
                 <a:latin typeface="맑은 고딕" pitchFamily="50" charset="-127"/>
                 <a:ea typeface="맑은 고딕" pitchFamily="50" charset="-127"/>
               </a:endParaRPr>
@@ -29450,7 +30165,7 @@
           <p:nvPr>
             <p:extLst>
               <p:ext uri="{D42A27DB-BD31-4B8C-83A1-F6EECF244321}">
-                <p14:modId xmlns:p14="http://schemas.microsoft.com/office/powerpoint/2010/main" val="1987688035"/>
+                <p14:modId xmlns:p14="http://schemas.microsoft.com/office/powerpoint/2010/main" val="857850709"/>
               </p:ext>
             </p:extLst>
           </p:nvPr>
@@ -29464,12 +30179,48 @@
             <a:tbl>
               <a:tblPr/>
               <a:tblGrid>
-                <a:gridCol w="1024554"/>
-                <a:gridCol w="2983884"/>
-                <a:gridCol w="1196090"/>
-                <a:gridCol w="1859283"/>
-                <a:gridCol w="597313"/>
-                <a:gridCol w="1272218"/>
+                <a:gridCol w="1024554">
+                  <a:extLst>
+                    <a:ext uri="{9D8B030D-6E8A-4147-A177-3AD203B41FA5}">
+                      <a16:colId xmlns:a16="http://schemas.microsoft.com/office/drawing/2014/main" xmlns="" val="20000"/>
+                    </a:ext>
+                  </a:extLst>
+                </a:gridCol>
+                <a:gridCol w="2983884">
+                  <a:extLst>
+                    <a:ext uri="{9D8B030D-6E8A-4147-A177-3AD203B41FA5}">
+                      <a16:colId xmlns:a16="http://schemas.microsoft.com/office/drawing/2014/main" xmlns="" val="20001"/>
+                    </a:ext>
+                  </a:extLst>
+                </a:gridCol>
+                <a:gridCol w="1196090">
+                  <a:extLst>
+                    <a:ext uri="{9D8B030D-6E8A-4147-A177-3AD203B41FA5}">
+                      <a16:colId xmlns:a16="http://schemas.microsoft.com/office/drawing/2014/main" xmlns="" val="20002"/>
+                    </a:ext>
+                  </a:extLst>
+                </a:gridCol>
+                <a:gridCol w="1859283">
+                  <a:extLst>
+                    <a:ext uri="{9D8B030D-6E8A-4147-A177-3AD203B41FA5}">
+                      <a16:colId xmlns:a16="http://schemas.microsoft.com/office/drawing/2014/main" xmlns="" val="20003"/>
+                    </a:ext>
+                  </a:extLst>
+                </a:gridCol>
+                <a:gridCol w="597313">
+                  <a:extLst>
+                    <a:ext uri="{9D8B030D-6E8A-4147-A177-3AD203B41FA5}">
+                      <a16:colId xmlns:a16="http://schemas.microsoft.com/office/drawing/2014/main" xmlns="" val="20004"/>
+                    </a:ext>
+                  </a:extLst>
+                </a:gridCol>
+                <a:gridCol w="1272218">
+                  <a:extLst>
+                    <a:ext uri="{9D8B030D-6E8A-4147-A177-3AD203B41FA5}">
+                      <a16:colId xmlns:a16="http://schemas.microsoft.com/office/drawing/2014/main" xmlns="" val="20005"/>
+                    </a:ext>
+                  </a:extLst>
+                </a:gridCol>
               </a:tblGrid>
               <a:tr h="299619">
                 <a:tc>
@@ -30058,6 +30809,11 @@
                     <a:noFill/>
                   </a:tcPr>
                 </a:tc>
+                <a:extLst>
+                  <a:ext uri="{0D108BD9-81ED-4DB2-BD59-A6C34878D82A}">
+                    <a16:rowId xmlns:a16="http://schemas.microsoft.com/office/drawing/2014/main" xmlns="" val="10000"/>
+                  </a:ext>
+                </a:extLst>
               </a:tr>
               <a:tr h="297106">
                 <a:tc>
@@ -30553,7 +31309,7 @@
                           <a:latin typeface="맑은 고딕" pitchFamily="50" charset="-127"/>
                           <a:ea typeface="맑은 고딕" pitchFamily="50" charset="-127"/>
                         </a:rPr>
-                        <a:t>2017.05.26 (V1.0)</a:t>
+                        <a:t>2017.05.26 (V0.6)</a:t>
                       </a:r>
                       <a:endParaRPr lang="ko-KR" altLang="en-US" sz="900" b="0" dirty="0">
                         <a:solidFill>
@@ -30610,6 +31366,11 @@
                     <a:noFill/>
                   </a:tcPr>
                 </a:tc>
+                <a:extLst>
+                  <a:ext uri="{0D108BD9-81ED-4DB2-BD59-A6C34878D82A}">
+                    <a16:rowId xmlns:a16="http://schemas.microsoft.com/office/drawing/2014/main" xmlns="" val="10001"/>
+                  </a:ext>
+                </a:extLst>
               </a:tr>
               <a:tr h="297106">
                 <a:tc>
@@ -31130,6 +31891,11 @@
                     <a:noFill/>
                   </a:tcPr>
                 </a:tc>
+                <a:extLst>
+                  <a:ext uri="{0D108BD9-81ED-4DB2-BD59-A6C34878D82A}">
+                    <a16:rowId xmlns:a16="http://schemas.microsoft.com/office/drawing/2014/main" xmlns="" val="10002"/>
+                  </a:ext>
+                </a:extLst>
               </a:tr>
             </a:tbl>
           </a:graphicData>
@@ -31588,8 +32354,13 @@
             <a:pPr algn="r"/>
             <a:r>
               <a:rPr lang="en-US" altLang="ko-KR" dirty="0"/>
-              <a:t>Eight Eureka</a:t>
+              <a:t>Eight Eureka 8</a:t>
             </a:r>
+            <a:r>
+              <a:rPr lang="ko-KR" altLang="en-US" dirty="0"/>
+              <a:t>조</a:t>
+            </a:r>
+            <a:endParaRPr lang="en-US" altLang="ko-KR" dirty="0"/>
           </a:p>
         </p:txBody>
       </p:sp>
@@ -31602,7 +32373,7 @@
           <p:nvPr>
             <p:extLst>
               <p:ext uri="{D42A27DB-BD31-4B8C-83A1-F6EECF244321}">
-                <p14:modId xmlns:p14="http://schemas.microsoft.com/office/powerpoint/2010/main" val="798142396"/>
+                <p14:modId xmlns:p14="http://schemas.microsoft.com/office/powerpoint/2010/main" val="1805358972"/>
               </p:ext>
             </p:extLst>
           </p:nvPr>
@@ -31616,12 +32387,48 @@
             <a:tbl>
               <a:tblPr/>
               <a:tblGrid>
-                <a:gridCol w="1024554"/>
-                <a:gridCol w="2983884"/>
-                <a:gridCol w="1196090"/>
-                <a:gridCol w="1859283"/>
-                <a:gridCol w="597313"/>
-                <a:gridCol w="1272218"/>
+                <a:gridCol w="1024554">
+                  <a:extLst>
+                    <a:ext uri="{9D8B030D-6E8A-4147-A177-3AD203B41FA5}">
+                      <a16:colId xmlns:a16="http://schemas.microsoft.com/office/drawing/2014/main" xmlns="" val="20000"/>
+                    </a:ext>
+                  </a:extLst>
+                </a:gridCol>
+                <a:gridCol w="2983884">
+                  <a:extLst>
+                    <a:ext uri="{9D8B030D-6E8A-4147-A177-3AD203B41FA5}">
+                      <a16:colId xmlns:a16="http://schemas.microsoft.com/office/drawing/2014/main" xmlns="" val="20001"/>
+                    </a:ext>
+                  </a:extLst>
+                </a:gridCol>
+                <a:gridCol w="1196090">
+                  <a:extLst>
+                    <a:ext uri="{9D8B030D-6E8A-4147-A177-3AD203B41FA5}">
+                      <a16:colId xmlns:a16="http://schemas.microsoft.com/office/drawing/2014/main" xmlns="" val="20002"/>
+                    </a:ext>
+                  </a:extLst>
+                </a:gridCol>
+                <a:gridCol w="1859283">
+                  <a:extLst>
+                    <a:ext uri="{9D8B030D-6E8A-4147-A177-3AD203B41FA5}">
+                      <a16:colId xmlns:a16="http://schemas.microsoft.com/office/drawing/2014/main" xmlns="" val="20003"/>
+                    </a:ext>
+                  </a:extLst>
+                </a:gridCol>
+                <a:gridCol w="597313">
+                  <a:extLst>
+                    <a:ext uri="{9D8B030D-6E8A-4147-A177-3AD203B41FA5}">
+                      <a16:colId xmlns:a16="http://schemas.microsoft.com/office/drawing/2014/main" xmlns="" val="20004"/>
+                    </a:ext>
+                  </a:extLst>
+                </a:gridCol>
+                <a:gridCol w="1272218">
+                  <a:extLst>
+                    <a:ext uri="{9D8B030D-6E8A-4147-A177-3AD203B41FA5}">
+                      <a16:colId xmlns:a16="http://schemas.microsoft.com/office/drawing/2014/main" xmlns="" val="20005"/>
+                    </a:ext>
+                  </a:extLst>
+                </a:gridCol>
               </a:tblGrid>
               <a:tr h="299619">
                 <a:tc>
@@ -32210,6 +33017,11 @@
                     <a:noFill/>
                   </a:tcPr>
                 </a:tc>
+                <a:extLst>
+                  <a:ext uri="{0D108BD9-81ED-4DB2-BD59-A6C34878D82A}">
+                    <a16:rowId xmlns:a16="http://schemas.microsoft.com/office/drawing/2014/main" xmlns="" val="10000"/>
+                  </a:ext>
+                </a:extLst>
               </a:tr>
               <a:tr h="297106">
                 <a:tc>
@@ -32707,7 +33519,7 @@
                           <a:latin typeface="맑은 고딕" pitchFamily="50" charset="-127"/>
                           <a:ea typeface="맑은 고딕" pitchFamily="50" charset="-127"/>
                         </a:rPr>
-                        <a:t>2017.05.26 (V1.0)</a:t>
+                        <a:t>2017.05.26 (V0.6)</a:t>
                       </a:r>
                       <a:endParaRPr lang="ko-KR" altLang="en-US" sz="900" b="0" dirty="0">
                         <a:solidFill>
@@ -32764,6 +33576,11 @@
                     <a:noFill/>
                   </a:tcPr>
                 </a:tc>
+                <a:extLst>
+                  <a:ext uri="{0D108BD9-81ED-4DB2-BD59-A6C34878D82A}">
+                    <a16:rowId xmlns:a16="http://schemas.microsoft.com/office/drawing/2014/main" xmlns="" val="10001"/>
+                  </a:ext>
+                </a:extLst>
               </a:tr>
               <a:tr h="297106">
                 <a:tc>
@@ -33284,6 +34101,11 @@
                     <a:noFill/>
                   </a:tcPr>
                 </a:tc>
+                <a:extLst>
+                  <a:ext uri="{0D108BD9-81ED-4DB2-BD59-A6C34878D82A}">
+                    <a16:rowId xmlns:a16="http://schemas.microsoft.com/office/drawing/2014/main" xmlns="" val="10002"/>
+                  </a:ext>
+                </a:extLst>
               </a:tr>
             </a:tbl>
           </a:graphicData>
@@ -33314,10 +34136,34 @@
                 <a:tableStyleId>{5940675A-B579-460E-94D1-54222C63F5DA}</a:tableStyleId>
               </a:tblPr>
               <a:tblGrid>
-                <a:gridCol w="504000"/>
-                <a:gridCol w="504000"/>
-                <a:gridCol w="1521016"/>
-                <a:gridCol w="1521016"/>
+                <a:gridCol w="504000">
+                  <a:extLst>
+                    <a:ext uri="{9D8B030D-6E8A-4147-A177-3AD203B41FA5}">
+                      <a16:colId xmlns:a16="http://schemas.microsoft.com/office/drawing/2014/main" xmlns="" val="20000"/>
+                    </a:ext>
+                  </a:extLst>
+                </a:gridCol>
+                <a:gridCol w="504000">
+                  <a:extLst>
+                    <a:ext uri="{9D8B030D-6E8A-4147-A177-3AD203B41FA5}">
+                      <a16:colId xmlns:a16="http://schemas.microsoft.com/office/drawing/2014/main" xmlns="" val="20001"/>
+                    </a:ext>
+                  </a:extLst>
+                </a:gridCol>
+                <a:gridCol w="1521016">
+                  <a:extLst>
+                    <a:ext uri="{9D8B030D-6E8A-4147-A177-3AD203B41FA5}">
+                      <a16:colId xmlns:a16="http://schemas.microsoft.com/office/drawing/2014/main" xmlns="" val="20002"/>
+                    </a:ext>
+                  </a:extLst>
+                </a:gridCol>
+                <a:gridCol w="1521016">
+                  <a:extLst>
+                    <a:ext uri="{9D8B030D-6E8A-4147-A177-3AD203B41FA5}">
+                      <a16:colId xmlns:a16="http://schemas.microsoft.com/office/drawing/2014/main" xmlns="" val="20003"/>
+                    </a:ext>
+                  </a:extLst>
+                </a:gridCol>
               </a:tblGrid>
               <a:tr h="301664">
                 <a:tc gridSpan="4">
@@ -33431,6 +34277,11 @@
                   </a:txBody>
                   <a:tcPr/>
                 </a:tc>
+                <a:extLst>
+                  <a:ext uri="{0D108BD9-81ED-4DB2-BD59-A6C34878D82A}">
+                    <a16:rowId xmlns:a16="http://schemas.microsoft.com/office/drawing/2014/main" xmlns="" val="10000"/>
+                  </a:ext>
+                </a:extLst>
               </a:tr>
               <a:tr h="238875">
                 <a:tc>
@@ -33589,6 +34440,11 @@
                     </a:solidFill>
                   </a:tcPr>
                 </a:tc>
+                <a:extLst>
+                  <a:ext uri="{0D108BD9-81ED-4DB2-BD59-A6C34878D82A}">
+                    <a16:rowId xmlns:a16="http://schemas.microsoft.com/office/drawing/2014/main" xmlns="" val="10001"/>
+                  </a:ext>
+                </a:extLst>
               </a:tr>
               <a:tr h="195561">
                 <a:tc>
@@ -33708,6 +34564,11 @@
                     </a:solidFill>
                   </a:tcPr>
                 </a:tc>
+                <a:extLst>
+                  <a:ext uri="{0D108BD9-81ED-4DB2-BD59-A6C34878D82A}">
+                    <a16:rowId xmlns:a16="http://schemas.microsoft.com/office/drawing/2014/main" xmlns="" val="10002"/>
+                  </a:ext>
+                </a:extLst>
               </a:tr>
               <a:tr h="195561">
                 <a:tc>
@@ -33860,6 +34721,11 @@
                     </a:solidFill>
                   </a:tcPr>
                 </a:tc>
+                <a:extLst>
+                  <a:ext uri="{0D108BD9-81ED-4DB2-BD59-A6C34878D82A}">
+                    <a16:rowId xmlns:a16="http://schemas.microsoft.com/office/drawing/2014/main" xmlns="" val="10003"/>
+                  </a:ext>
+                </a:extLst>
               </a:tr>
               <a:tr h="195561">
                 <a:tc>
@@ -34002,6 +34868,11 @@
                     </a:solidFill>
                   </a:tcPr>
                 </a:tc>
+                <a:extLst>
+                  <a:ext uri="{0D108BD9-81ED-4DB2-BD59-A6C34878D82A}">
+                    <a16:rowId xmlns:a16="http://schemas.microsoft.com/office/drawing/2014/main" xmlns="" val="10004"/>
+                  </a:ext>
+                </a:extLst>
               </a:tr>
             </a:tbl>
           </a:graphicData>
@@ -34616,8 +35487,13 @@
             <a:pPr algn="r"/>
             <a:r>
               <a:rPr lang="en-US" altLang="ko-KR" dirty="0"/>
-              <a:t>Eight Eureka</a:t>
+              <a:t>Eight Eureka 8</a:t>
             </a:r>
+            <a:r>
+              <a:rPr lang="ko-KR" altLang="en-US" dirty="0"/>
+              <a:t>조</a:t>
+            </a:r>
+            <a:endParaRPr lang="en-US" altLang="ko-KR" dirty="0"/>
           </a:p>
         </p:txBody>
       </p:sp>
@@ -35004,7 +35880,7 @@
           <p:nvPr>
             <p:extLst>
               <p:ext uri="{D42A27DB-BD31-4B8C-83A1-F6EECF244321}">
-                <p14:modId xmlns:p14="http://schemas.microsoft.com/office/powerpoint/2010/main" val="1652764771"/>
+                <p14:modId xmlns:p14="http://schemas.microsoft.com/office/powerpoint/2010/main" val="328485181"/>
               </p:ext>
             </p:extLst>
           </p:nvPr>
@@ -35018,12 +35894,48 @@
             <a:tbl>
               <a:tblPr/>
               <a:tblGrid>
-                <a:gridCol w="1024554"/>
-                <a:gridCol w="2983884"/>
-                <a:gridCol w="1196090"/>
-                <a:gridCol w="1859283"/>
-                <a:gridCol w="597313"/>
-                <a:gridCol w="1272218"/>
+                <a:gridCol w="1024554">
+                  <a:extLst>
+                    <a:ext uri="{9D8B030D-6E8A-4147-A177-3AD203B41FA5}">
+                      <a16:colId xmlns:a16="http://schemas.microsoft.com/office/drawing/2014/main" xmlns="" val="20000"/>
+                    </a:ext>
+                  </a:extLst>
+                </a:gridCol>
+                <a:gridCol w="2983884">
+                  <a:extLst>
+                    <a:ext uri="{9D8B030D-6E8A-4147-A177-3AD203B41FA5}">
+                      <a16:colId xmlns:a16="http://schemas.microsoft.com/office/drawing/2014/main" xmlns="" val="20001"/>
+                    </a:ext>
+                  </a:extLst>
+                </a:gridCol>
+                <a:gridCol w="1196090">
+                  <a:extLst>
+                    <a:ext uri="{9D8B030D-6E8A-4147-A177-3AD203B41FA5}">
+                      <a16:colId xmlns:a16="http://schemas.microsoft.com/office/drawing/2014/main" xmlns="" val="20002"/>
+                    </a:ext>
+                  </a:extLst>
+                </a:gridCol>
+                <a:gridCol w="1859283">
+                  <a:extLst>
+                    <a:ext uri="{9D8B030D-6E8A-4147-A177-3AD203B41FA5}">
+                      <a16:colId xmlns:a16="http://schemas.microsoft.com/office/drawing/2014/main" xmlns="" val="20003"/>
+                    </a:ext>
+                  </a:extLst>
+                </a:gridCol>
+                <a:gridCol w="597313">
+                  <a:extLst>
+                    <a:ext uri="{9D8B030D-6E8A-4147-A177-3AD203B41FA5}">
+                      <a16:colId xmlns:a16="http://schemas.microsoft.com/office/drawing/2014/main" xmlns="" val="20004"/>
+                    </a:ext>
+                  </a:extLst>
+                </a:gridCol>
+                <a:gridCol w="1272218">
+                  <a:extLst>
+                    <a:ext uri="{9D8B030D-6E8A-4147-A177-3AD203B41FA5}">
+                      <a16:colId xmlns:a16="http://schemas.microsoft.com/office/drawing/2014/main" xmlns="" val="20005"/>
+                    </a:ext>
+                  </a:extLst>
+                </a:gridCol>
               </a:tblGrid>
               <a:tr h="299619">
                 <a:tc>
@@ -35611,6 +36523,11 @@
                     <a:noFill/>
                   </a:tcPr>
                 </a:tc>
+                <a:extLst>
+                  <a:ext uri="{0D108BD9-81ED-4DB2-BD59-A6C34878D82A}">
+                    <a16:rowId xmlns:a16="http://schemas.microsoft.com/office/drawing/2014/main" xmlns="" val="10000"/>
+                  </a:ext>
+                </a:extLst>
               </a:tr>
               <a:tr h="297106">
                 <a:tc>
@@ -36107,7 +37024,7 @@
                           <a:latin typeface="맑은 고딕" pitchFamily="50" charset="-127"/>
                           <a:ea typeface="맑은 고딕" pitchFamily="50" charset="-127"/>
                         </a:rPr>
-                        <a:t>2017.05.26 (V1.0)</a:t>
+                        <a:t>2017.05.26 (V0.6)</a:t>
                       </a:r>
                       <a:endParaRPr lang="ko-KR" altLang="en-US" sz="900" b="0" dirty="0">
                         <a:solidFill>
@@ -36164,6 +37081,11 @@
                     <a:noFill/>
                   </a:tcPr>
                 </a:tc>
+                <a:extLst>
+                  <a:ext uri="{0D108BD9-81ED-4DB2-BD59-A6C34878D82A}">
+                    <a16:rowId xmlns:a16="http://schemas.microsoft.com/office/drawing/2014/main" xmlns="" val="10001"/>
+                  </a:ext>
+                </a:extLst>
               </a:tr>
               <a:tr h="297106">
                 <a:tc>
@@ -36684,6 +37606,11 @@
                     <a:noFill/>
                   </a:tcPr>
                 </a:tc>
+                <a:extLst>
+                  <a:ext uri="{0D108BD9-81ED-4DB2-BD59-A6C34878D82A}">
+                    <a16:rowId xmlns:a16="http://schemas.microsoft.com/office/drawing/2014/main" xmlns="" val="10002"/>
+                  </a:ext>
+                </a:extLst>
               </a:tr>
             </a:tbl>
           </a:graphicData>

</xml_diff>